<commit_message>
companion objects and apply method, lambda functions
</commit_message>
<xml_diff>
--- a/SCALA.pptx
+++ b/SCALA.pptx
@@ -18,8 +18,8 @@
     <p:sldId id="263" r:id="rId9"/>
     <p:sldId id="264" r:id="rId10"/>
     <p:sldId id="265" r:id="rId11"/>
-    <p:sldId id="266" r:id="rId12"/>
-    <p:sldId id="267" r:id="rId13"/>
+    <p:sldId id="267" r:id="rId12"/>
+    <p:sldId id="266" r:id="rId13"/>
   </p:sldIdLst>
   <p:sldSz cx="12192000" cy="6858000"/>
   <p:notesSz cx="6858000" cy="9144000"/>
@@ -234,7 +234,7 @@
           <a:p>
             <a:fld id="{C5CD1456-AA00-4668-A255-DC6FE20BE111}" type="datetimeFigureOut">
               <a:rPr lang="pl-PL" smtClean="0"/>
-              <a:t>29.03.2021</a:t>
+              <a:t>30.03.2021</a:t>
             </a:fld>
             <a:endParaRPr lang="pl-PL"/>
           </a:p>
@@ -695,6 +695,136 @@
 </p:notes>
 </file>
 
+<file path=ppt/notesSlides/notesSlide10.xml><?xml version="1.0" encoding="utf-8"?>
+<p:notes xmlns:a="http://schemas.openxmlformats.org/drawingml/2006/main" xmlns:r="http://schemas.openxmlformats.org/officeDocument/2006/relationships" xmlns:p="http://schemas.openxmlformats.org/presentationml/2006/main">
+  <p:cSld>
+    <p:spTree>
+      <p:nvGrpSpPr>
+        <p:cNvPr id="1" name=""/>
+        <p:cNvGrpSpPr/>
+        <p:nvPr/>
+      </p:nvGrpSpPr>
+      <p:grpSpPr>
+        <a:xfrm>
+          <a:off x="0" y="0"/>
+          <a:ext cx="0" cy="0"/>
+          <a:chOff x="0" y="0"/>
+          <a:chExt cx="0" cy="0"/>
+        </a:xfrm>
+      </p:grpSpPr>
+      <p:sp>
+        <p:nvSpPr>
+          <p:cNvPr id="2" name="Symbol zastępczy obrazu slajdu 1"/>
+          <p:cNvSpPr>
+            <a:spLocks noGrp="1" noRot="1" noChangeAspect="1"/>
+          </p:cNvSpPr>
+          <p:nvPr>
+            <p:ph type="sldImg"/>
+          </p:nvPr>
+        </p:nvSpPr>
+        <p:spPr/>
+      </p:sp>
+      <p:sp>
+        <p:nvSpPr>
+          <p:cNvPr id="3" name="Symbol zastępczy notatek 2"/>
+          <p:cNvSpPr>
+            <a:spLocks noGrp="1"/>
+          </p:cNvSpPr>
+          <p:nvPr>
+            <p:ph type="body" idx="1"/>
+          </p:nvPr>
+        </p:nvSpPr>
+        <p:spPr/>
+        <p:txBody>
+          <a:bodyPr/>
+          <a:lstStyle/>
+          <a:p>
+            <a:endParaRPr lang="pl-PL" dirty="0"/>
+          </a:p>
+          <a:p>
+            <a:r>
+              <a:rPr lang="pl-PL" dirty="0"/>
+              <a:t>Kiedy zdefiniujemy metodę </a:t>
+            </a:r>
+            <a:r>
+              <a:rPr lang="pl-PL" dirty="0" err="1"/>
+              <a:t>Apply</a:t>
+            </a:r>
+            <a:r>
+              <a:rPr lang="pl-PL" dirty="0"/>
+              <a:t> w obiekcie towarzyszącym, ma to specjalne znaczenie dla kompilatora Scala. W Scali jest tzw. cukier składniowy (</a:t>
+            </a:r>
+            <a:r>
+              <a:rPr lang="pl-PL" dirty="0" err="1"/>
+              <a:t>syntactic</a:t>
+            </a:r>
+            <a:r>
+              <a:rPr lang="pl-PL" dirty="0"/>
+              <a:t> </a:t>
+            </a:r>
+            <a:r>
+              <a:rPr lang="pl-PL" dirty="0" err="1"/>
+              <a:t>sugar</a:t>
+            </a:r>
+            <a:r>
+              <a:rPr lang="pl-PL" dirty="0"/>
+              <a:t>), który umożliwia wpisanie tego kodu [1] a podczas procesu kompilacji kompilator zamienia ten kod na [2]. Metoda </a:t>
+            </a:r>
+            <a:r>
+              <a:rPr lang="pl-PL" dirty="0" err="1"/>
+              <a:t>Apply</a:t>
+            </a:r>
+            <a:r>
+              <a:rPr lang="pl-PL" dirty="0"/>
+              <a:t> w obiekcie towarzyszącym działa jak metoda fabryki, a dzięki właśnie temu cukrowi Scala pozwala na użycie takiej składni do tworzenia nowych instancji klas bez użycia słowa kluczowego </a:t>
+            </a:r>
+            <a:r>
+              <a:rPr lang="pl-PL" dirty="0" err="1"/>
+              <a:t>new</a:t>
+            </a:r>
+            <a:r>
+              <a:rPr lang="pl-PL" dirty="0"/>
+              <a:t>.</a:t>
+            </a:r>
+          </a:p>
+        </p:txBody>
+      </p:sp>
+      <p:sp>
+        <p:nvSpPr>
+          <p:cNvPr id="4" name="Symbol zastępczy numeru slajdu 3"/>
+          <p:cNvSpPr>
+            <a:spLocks noGrp="1"/>
+          </p:cNvSpPr>
+          <p:nvPr>
+            <p:ph type="sldNum" sz="quarter" idx="5"/>
+          </p:nvPr>
+        </p:nvSpPr>
+        <p:spPr/>
+        <p:txBody>
+          <a:bodyPr/>
+          <a:lstStyle/>
+          <a:p>
+            <a:fld id="{6839968B-1966-479B-907B-2C4A53864213}" type="slidenum">
+              <a:rPr lang="pl-PL" smtClean="0"/>
+              <a:t>12</a:t>
+            </a:fld>
+            <a:endParaRPr lang="pl-PL"/>
+          </a:p>
+        </p:txBody>
+      </p:sp>
+    </p:spTree>
+    <p:extLst>
+      <p:ext uri="{BB962C8B-B14F-4D97-AF65-F5344CB8AC3E}">
+        <p14:creationId xmlns:p14="http://schemas.microsoft.com/office/powerpoint/2010/main" val="2827181840"/>
+      </p:ext>
+    </p:extLst>
+  </p:cSld>
+  <p:clrMapOvr>
+    <a:masterClrMapping/>
+  </p:clrMapOvr>
+</p:notes>
+</file>
+
 <file path=ppt/notesSlides/notesSlide2.xml><?xml version="1.0" encoding="utf-8"?>
 <p:notes xmlns:a="http://schemas.openxmlformats.org/drawingml/2006/main" xmlns:r="http://schemas.openxmlformats.org/officeDocument/2006/relationships" xmlns:p="http://schemas.openxmlformats.org/presentationml/2006/main">
   <p:cSld>
@@ -1390,6 +1520,92 @@
           <a:p>
             <a:r>
               <a:rPr lang="pl-PL" dirty="0"/>
+              <a:t>Mamy kilka sposobów tworzenia list, tak jak w sumie prawie w każdym elemencie Scali. Jeżeli nie zadeklarujemy typu listy, tak jak tutaj na zdjęciu w drugim przykładzie, to można do niej wrzucić cokolwiek.</a:t>
+            </a:r>
+          </a:p>
+          <a:p>
+            <a:r>
+              <a:rPr lang="pl-PL" dirty="0"/>
+              <a:t>List jest z pakietu </a:t>
+            </a:r>
+            <a:r>
+              <a:rPr lang="pl-PL" b="0" i="0" u="sng" dirty="0" err="1">
+                <a:solidFill>
+                  <a:srgbClr val="103A51"/>
+                </a:solidFill>
+                <a:effectLst/>
+                <a:latin typeface="Arial" panose="020B0604020202020204" pitchFamily="34" charset="0"/>
+                <a:hlinkClick r:id="rId3" tooltip="scala"/>
+              </a:rPr>
+              <a:t>scala</a:t>
+            </a:r>
+            <a:r>
+              <a:rPr lang="pl-PL" b="0" i="0" dirty="0" err="1">
+                <a:solidFill>
+                  <a:srgbClr val="103A51"/>
+                </a:solidFill>
+                <a:effectLst/>
+                <a:latin typeface="Arial" panose="020B0604020202020204" pitchFamily="34" charset="0"/>
+              </a:rPr>
+              <a:t>.</a:t>
+            </a:r>
+            <a:r>
+              <a:rPr lang="pl-PL" b="0" i="0" u="sng" dirty="0" err="1">
+                <a:solidFill>
+                  <a:srgbClr val="103A51"/>
+                </a:solidFill>
+                <a:effectLst/>
+                <a:latin typeface="Arial" panose="020B0604020202020204" pitchFamily="34" charset="0"/>
+                <a:hlinkClick r:id="rId4" tooltip="scala.collection"/>
+              </a:rPr>
+              <a:t>collection</a:t>
+            </a:r>
+            <a:r>
+              <a:rPr lang="pl-PL" b="0" i="0" dirty="0" err="1">
+                <a:solidFill>
+                  <a:srgbClr val="103A51"/>
+                </a:solidFill>
+                <a:effectLst/>
+                <a:latin typeface="Arial" panose="020B0604020202020204" pitchFamily="34" charset="0"/>
+              </a:rPr>
+              <a:t>.</a:t>
+            </a:r>
+            <a:r>
+              <a:rPr lang="pl-PL" b="0" i="0" u="sng" dirty="0" err="1">
+                <a:solidFill>
+                  <a:srgbClr val="103A51"/>
+                </a:solidFill>
+                <a:effectLst/>
+                <a:latin typeface="Arial" panose="020B0604020202020204" pitchFamily="34" charset="0"/>
+                <a:hlinkClick r:id="rId5" tooltip="scala.collection.immutable"/>
+              </a:rPr>
+              <a:t>immutable</a:t>
+            </a:r>
+            <a:r>
+              <a:rPr lang="pl-PL" dirty="0"/>
+              <a:t>, zatem nie można ich modyfikować </a:t>
+            </a:r>
+          </a:p>
+          <a:p>
+            <a:pPr marL="0" marR="0" lvl="0" indent="0" algn="l" defTabSz="914400" rtl="0" eaLnBrk="1" fontAlgn="auto" latinLnBrk="0" hangingPunct="1">
+              <a:lnSpc>
+                <a:spcPct val="100000"/>
+              </a:lnSpc>
+              <a:spcBef>
+                <a:spcPts val="0"/>
+              </a:spcBef>
+              <a:spcAft>
+                <a:spcPts val="0"/>
+              </a:spcAft>
+              <a:buClrTx/>
+              <a:buSzTx/>
+              <a:buFontTx/>
+              <a:buNone/>
+              <a:tabLst/>
+              <a:defRPr/>
+            </a:pPr>
+            <a:r>
+              <a:rPr lang="pl-PL" dirty="0"/>
               <a:t>Listy Ta klasa jest optymalna dla wzorców dostępu typu </a:t>
             </a:r>
             <a:r>
@@ -1408,6 +1624,9 @@
               <a:rPr lang="pl-PL" dirty="0"/>
               <a:t>-out (LIFO), czyli stosu. Dla innych list lepiej jest użyć innej klasy </a:t>
             </a:r>
+          </a:p>
+          <a:p>
+            <a:endParaRPr lang="pl-PL" dirty="0"/>
           </a:p>
         </p:txBody>
       </p:sp>
@@ -1509,13 +1728,40 @@
             </a:r>
             <a:r>
               <a:rPr lang="pl-PL" dirty="0"/>
-              <a:t> są niezmienne i szczególnie przydatne do zwracania wielu wartości z metody. Maksymalnie w krotce możemy mieć 22 elementy, jak spróbujemy stworzyć krotkę z większą ilością elementów to dostaniemy błąd i program się </a:t>
-            </a:r>
-            <a:r>
-              <a:rPr lang="pl-PL"/>
-              <a:t>nie zbuduje.</a:t>
-            </a:r>
-            <a:endParaRPr lang="pl-PL" dirty="0"/>
+              <a:t> są niezmienne i szczególnie przydatne do zwracania wielu wartości z metody. Maksymalnie w krotce możemy mieć 22 elementy, jak spróbujemy stworzyć krotkę z większą ilością elementów to dostaniemy błąd i program się nie zbuduje. Jest ona podobnie jak lista </a:t>
+            </a:r>
+            <a:r>
+              <a:rPr lang="pl-PL" dirty="0" err="1"/>
+              <a:t>niemutowalna</a:t>
+            </a:r>
+            <a:r>
+              <a:rPr lang="pl-PL" dirty="0"/>
+              <a:t>. Jednak nie jest ona z pakietu </a:t>
+            </a:r>
+            <a:r>
+              <a:rPr lang="pl-PL" dirty="0" err="1"/>
+              <a:t>collection</a:t>
+            </a:r>
+            <a:r>
+              <a:rPr lang="pl-PL" dirty="0"/>
+              <a:t> zatem technicznie nie jest kolekcją. Na </a:t>
+            </a:r>
+            <a:r>
+              <a:rPr lang="pl-PL" dirty="0" err="1"/>
+              <a:t>screenie</a:t>
+            </a:r>
+            <a:r>
+              <a:rPr lang="pl-PL" dirty="0"/>
+              <a:t> widać jak można się odwoływać do poszczególnych elementów </a:t>
+            </a:r>
+            <a:r>
+              <a:rPr lang="pl-PL" dirty="0" err="1"/>
+              <a:t>krotki</a:t>
+            </a:r>
+            <a:r>
+              <a:rPr lang="pl-PL" dirty="0"/>
+              <a:t>.</a:t>
+            </a:r>
           </a:p>
         </p:txBody>
       </p:sp>
@@ -1546,6 +1792,278 @@
     <p:extLst>
       <p:ext uri="{BB962C8B-B14F-4D97-AF65-F5344CB8AC3E}">
         <p14:creationId xmlns:p14="http://schemas.microsoft.com/office/powerpoint/2010/main" val="4188111866"/>
+      </p:ext>
+    </p:extLst>
+  </p:cSld>
+  <p:clrMapOvr>
+    <a:masterClrMapping/>
+  </p:clrMapOvr>
+</p:notes>
+</file>
+
+<file path=ppt/notesSlides/notesSlide8.xml><?xml version="1.0" encoding="utf-8"?>
+<p:notes xmlns:a="http://schemas.openxmlformats.org/drawingml/2006/main" xmlns:r="http://schemas.openxmlformats.org/officeDocument/2006/relationships" xmlns:p="http://schemas.openxmlformats.org/presentationml/2006/main">
+  <p:cSld>
+    <p:spTree>
+      <p:nvGrpSpPr>
+        <p:cNvPr id="1" name=""/>
+        <p:cNvGrpSpPr/>
+        <p:nvPr/>
+      </p:nvGrpSpPr>
+      <p:grpSpPr>
+        <a:xfrm>
+          <a:off x="0" y="0"/>
+          <a:ext cx="0" cy="0"/>
+          <a:chOff x="0" y="0"/>
+          <a:chExt cx="0" cy="0"/>
+        </a:xfrm>
+      </p:grpSpPr>
+      <p:sp>
+        <p:nvSpPr>
+          <p:cNvPr id="2" name="Symbol zastępczy obrazu slajdu 1"/>
+          <p:cNvSpPr>
+            <a:spLocks noGrp="1" noRot="1" noChangeAspect="1"/>
+          </p:cNvSpPr>
+          <p:nvPr>
+            <p:ph type="sldImg"/>
+          </p:nvPr>
+        </p:nvSpPr>
+        <p:spPr/>
+      </p:sp>
+      <p:sp>
+        <p:nvSpPr>
+          <p:cNvPr id="3" name="Symbol zastępczy notatek 2"/>
+          <p:cNvSpPr>
+            <a:spLocks noGrp="1"/>
+          </p:cNvSpPr>
+          <p:nvPr>
+            <p:ph type="body" idx="1"/>
+          </p:nvPr>
+        </p:nvSpPr>
+        <p:spPr/>
+        <p:txBody>
+          <a:bodyPr/>
+          <a:lstStyle/>
+          <a:p>
+            <a:r>
+              <a:rPr lang="pl-PL" dirty="0"/>
+              <a:t>Wyrażenie lambda odnosi się do wyrażenia, które używa anonimowej funkcji zamiast zmiennej lub wartości. Wyrażenia lambda są wygodniejsze, gdy mamy prostą funkcję do użycia w jednym miejscu. Te wyrażenia są szybsze i bardziej czytelne niż definiowanie całej funkcji. Możemy uczynić nasze wyrażenia lambda wielokrotnego użytku dla dowolnego rodzaju przekształceń. Potrafi iterować zbiór obiektów i dokonywać w nich jakiejś transformacji. </a:t>
+            </a:r>
+          </a:p>
+          <a:p>
+            <a:endParaRPr lang="pl-PL" dirty="0"/>
+          </a:p>
+          <a:p>
+            <a:r>
+              <a:rPr lang="pl-PL" dirty="0"/>
+              <a:t>Ponadto, funkcje lambda mogą być stosowane jak pola danej klasy, czy też na przykład użyte tylko raz, dzięki czemu nie trzeba specjalnie tworzyć nowej metody tylko </a:t>
+            </a:r>
+            <a:r>
+              <a:rPr lang="pl-PL"/>
+              <a:t>wystarczy użyć lambdy.</a:t>
+            </a:r>
+            <a:endParaRPr lang="pl-PL" dirty="0"/>
+          </a:p>
+        </p:txBody>
+      </p:sp>
+      <p:sp>
+        <p:nvSpPr>
+          <p:cNvPr id="4" name="Symbol zastępczy numeru slajdu 3"/>
+          <p:cNvSpPr>
+            <a:spLocks noGrp="1"/>
+          </p:cNvSpPr>
+          <p:nvPr>
+            <p:ph type="sldNum" sz="quarter" idx="5"/>
+          </p:nvPr>
+        </p:nvSpPr>
+        <p:spPr/>
+        <p:txBody>
+          <a:bodyPr/>
+          <a:lstStyle/>
+          <a:p>
+            <a:fld id="{6839968B-1966-479B-907B-2C4A53864213}" type="slidenum">
+              <a:rPr lang="pl-PL" smtClean="0"/>
+              <a:t>10</a:t>
+            </a:fld>
+            <a:endParaRPr lang="pl-PL"/>
+          </a:p>
+        </p:txBody>
+      </p:sp>
+    </p:spTree>
+    <p:extLst>
+      <p:ext uri="{BB962C8B-B14F-4D97-AF65-F5344CB8AC3E}">
+        <p14:creationId xmlns:p14="http://schemas.microsoft.com/office/powerpoint/2010/main" val="2129365955"/>
+      </p:ext>
+    </p:extLst>
+  </p:cSld>
+  <p:clrMapOvr>
+    <a:masterClrMapping/>
+  </p:clrMapOvr>
+</p:notes>
+</file>
+
+<file path=ppt/notesSlides/notesSlide9.xml><?xml version="1.0" encoding="utf-8"?>
+<p:notes xmlns:a="http://schemas.openxmlformats.org/drawingml/2006/main" xmlns:r="http://schemas.openxmlformats.org/officeDocument/2006/relationships" xmlns:p="http://schemas.openxmlformats.org/presentationml/2006/main">
+  <p:cSld>
+    <p:spTree>
+      <p:nvGrpSpPr>
+        <p:cNvPr id="1" name=""/>
+        <p:cNvGrpSpPr/>
+        <p:nvPr/>
+      </p:nvGrpSpPr>
+      <p:grpSpPr>
+        <a:xfrm>
+          <a:off x="0" y="0"/>
+          <a:ext cx="0" cy="0"/>
+          <a:chOff x="0" y="0"/>
+          <a:chExt cx="0" cy="0"/>
+        </a:xfrm>
+      </p:grpSpPr>
+      <p:sp>
+        <p:nvSpPr>
+          <p:cNvPr id="2" name="Symbol zastępczy obrazu slajdu 1"/>
+          <p:cNvSpPr>
+            <a:spLocks noGrp="1" noRot="1" noChangeAspect="1"/>
+          </p:cNvSpPr>
+          <p:nvPr>
+            <p:ph type="sldImg"/>
+          </p:nvPr>
+        </p:nvSpPr>
+        <p:spPr/>
+      </p:sp>
+      <p:sp>
+        <p:nvSpPr>
+          <p:cNvPr id="3" name="Symbol zastępczy notatek 2"/>
+          <p:cNvSpPr>
+            <a:spLocks noGrp="1"/>
+          </p:cNvSpPr>
+          <p:nvPr>
+            <p:ph type="body" idx="1"/>
+          </p:nvPr>
+        </p:nvSpPr>
+        <p:spPr/>
+        <p:txBody>
+          <a:bodyPr/>
+          <a:lstStyle/>
+          <a:p>
+            <a:pPr marL="0" marR="0" lvl="0" indent="0" algn="l" defTabSz="914400" rtl="0" eaLnBrk="1" fontAlgn="auto" latinLnBrk="0" hangingPunct="1">
+              <a:lnSpc>
+                <a:spcPct val="100000"/>
+              </a:lnSpc>
+              <a:spcBef>
+                <a:spcPts val="0"/>
+              </a:spcBef>
+              <a:spcAft>
+                <a:spcPts val="0"/>
+              </a:spcAft>
+              <a:buClrTx/>
+              <a:buSzTx/>
+              <a:buFontTx/>
+              <a:buNone/>
+              <a:tabLst/>
+              <a:defRPr/>
+            </a:pPr>
+            <a:r>
+              <a:rPr lang="pl-PL" b="0" i="0" dirty="0">
+                <a:solidFill>
+                  <a:srgbClr val="4A5659"/>
+                </a:solidFill>
+                <a:effectLst/>
+                <a:latin typeface="Lato"/>
+              </a:rPr>
+              <a:t>Teraz jeszcze wspomnę o obiektach towarzyszących, czyli Companion </a:t>
+            </a:r>
+            <a:r>
+              <a:rPr lang="pl-PL" b="0" i="0" dirty="0" err="1">
+                <a:solidFill>
+                  <a:srgbClr val="4A5659"/>
+                </a:solidFill>
+                <a:effectLst/>
+                <a:latin typeface="Lato"/>
+              </a:rPr>
+              <a:t>objects</a:t>
+            </a:r>
+            <a:r>
+              <a:rPr lang="pl-PL" b="0" i="0" dirty="0">
+                <a:solidFill>
+                  <a:srgbClr val="4A5659"/>
+                </a:solidFill>
+                <a:effectLst/>
+                <a:latin typeface="Lato"/>
+              </a:rPr>
+              <a:t>, ponieważ były już one prezentowane przez poprzednie grupy.</a:t>
+            </a:r>
+          </a:p>
+          <a:p>
+            <a:pPr marL="0" marR="0" lvl="0" indent="0" algn="l" defTabSz="914400" rtl="0" eaLnBrk="1" fontAlgn="auto" latinLnBrk="0" hangingPunct="1">
+              <a:lnSpc>
+                <a:spcPct val="100000"/>
+              </a:lnSpc>
+              <a:spcBef>
+                <a:spcPts val="0"/>
+              </a:spcBef>
+              <a:spcAft>
+                <a:spcPts val="0"/>
+              </a:spcAft>
+              <a:buClrTx/>
+              <a:buSzTx/>
+              <a:buFontTx/>
+              <a:buNone/>
+              <a:tabLst/>
+              <a:defRPr/>
+            </a:pPr>
+            <a:r>
+              <a:rPr lang="pl-PL" b="0" i="0" dirty="0">
+                <a:solidFill>
+                  <a:srgbClr val="4A5659"/>
+                </a:solidFill>
+                <a:effectLst/>
+                <a:latin typeface="Lato"/>
+              </a:rPr>
+              <a:t>Obiekt towarzyszący w Scali to obiekt zadeklarowany w tym samym pliku co klasa i mający taką samą nazwę jak klasa. Dla przykładu, z kodu na slajdzie obiekt Pizza jest traktowany jako obiekt towarzyszący klasie Pizza</a:t>
+            </a:r>
+          </a:p>
+          <a:p>
+            <a:endParaRPr lang="pl-PL" dirty="0"/>
+          </a:p>
+          <a:p>
+            <a:endParaRPr lang="pl-PL" dirty="0"/>
+          </a:p>
+          <a:p>
+            <a:r>
+              <a:rPr lang="pl-PL" dirty="0"/>
+              <a:t>Obiekt towarzyszący i jego klasa mogą wzajemnie uzyskiwać dostęp do swoich prywatnych elementów</a:t>
+            </a:r>
+          </a:p>
+        </p:txBody>
+      </p:sp>
+      <p:sp>
+        <p:nvSpPr>
+          <p:cNvPr id="4" name="Symbol zastępczy numeru slajdu 3"/>
+          <p:cNvSpPr>
+            <a:spLocks noGrp="1"/>
+          </p:cNvSpPr>
+          <p:nvPr>
+            <p:ph type="sldNum" sz="quarter" idx="5"/>
+          </p:nvPr>
+        </p:nvSpPr>
+        <p:spPr/>
+        <p:txBody>
+          <a:bodyPr/>
+          <a:lstStyle/>
+          <a:p>
+            <a:fld id="{6839968B-1966-479B-907B-2C4A53864213}" type="slidenum">
+              <a:rPr lang="pl-PL" smtClean="0"/>
+              <a:t>11</a:t>
+            </a:fld>
+            <a:endParaRPr lang="pl-PL"/>
+          </a:p>
+        </p:txBody>
+      </p:sp>
+    </p:spTree>
+    <p:extLst>
+      <p:ext uri="{BB962C8B-B14F-4D97-AF65-F5344CB8AC3E}">
+        <p14:creationId xmlns:p14="http://schemas.microsoft.com/office/powerpoint/2010/main" val="3698356094"/>
       </p:ext>
     </p:extLst>
   </p:cSld>
@@ -5831,7 +6349,7 @@
           <a:p>
             <a:fld id="{48A87A34-81AB-432B-8DAE-1953F412C126}" type="datetimeFigureOut">
               <a:rPr lang="en-US" dirty="0"/>
-              <a:t>3/29/2021</a:t>
+              <a:t>3/30/2021</a:t>
             </a:fld>
             <a:endParaRPr lang="en-US" dirty="0"/>
           </a:p>
@@ -6093,7 +6611,7 @@
           <a:p>
             <a:fld id="{48A87A34-81AB-432B-8DAE-1953F412C126}" type="datetimeFigureOut">
               <a:rPr lang="en-US" dirty="0"/>
-              <a:t>3/29/2021</a:t>
+              <a:t>3/30/2021</a:t>
             </a:fld>
             <a:endParaRPr lang="en-US" dirty="0"/>
           </a:p>
@@ -6284,7 +6802,7 @@
           <a:p>
             <a:fld id="{48A87A34-81AB-432B-8DAE-1953F412C126}" type="datetimeFigureOut">
               <a:rPr lang="en-US" dirty="0"/>
-              <a:t>3/29/2021</a:t>
+              <a:t>3/30/2021</a:t>
             </a:fld>
             <a:endParaRPr lang="en-US" dirty="0"/>
           </a:p>
@@ -6542,7 +7060,7 @@
           <a:p>
             <a:fld id="{48A87A34-81AB-432B-8DAE-1953F412C126}" type="datetimeFigureOut">
               <a:rPr lang="en-US" dirty="0"/>
-              <a:t>3/29/2021</a:t>
+              <a:t>3/30/2021</a:t>
             </a:fld>
             <a:endParaRPr lang="en-US" dirty="0"/>
           </a:p>
@@ -6971,7 +7489,7 @@
           <a:p>
             <a:fld id="{48A87A34-81AB-432B-8DAE-1953F412C126}" type="datetimeFigureOut">
               <a:rPr lang="en-US" dirty="0"/>
-              <a:t>3/29/2021</a:t>
+              <a:t>3/30/2021</a:t>
             </a:fld>
             <a:endParaRPr lang="en-US" dirty="0"/>
           </a:p>
@@ -7512,7 +8030,7 @@
           <a:p>
             <a:fld id="{48A87A34-81AB-432B-8DAE-1953F412C126}" type="datetimeFigureOut">
               <a:rPr lang="en-US" dirty="0"/>
-              <a:t>3/29/2021</a:t>
+              <a:t>3/30/2021</a:t>
             </a:fld>
             <a:endParaRPr lang="en-US" dirty="0"/>
           </a:p>
@@ -8227,7 +8745,7 @@
           <a:p>
             <a:fld id="{48A87A34-81AB-432B-8DAE-1953F412C126}" type="datetimeFigureOut">
               <a:rPr lang="en-US" dirty="0"/>
-              <a:t>3/29/2021</a:t>
+              <a:t>3/30/2021</a:t>
             </a:fld>
             <a:endParaRPr lang="en-US" dirty="0"/>
           </a:p>
@@ -8392,7 +8910,7 @@
           <a:p>
             <a:fld id="{48A87A34-81AB-432B-8DAE-1953F412C126}" type="datetimeFigureOut">
               <a:rPr lang="en-US" dirty="0"/>
-              <a:t>3/29/2021</a:t>
+              <a:t>3/30/2021</a:t>
             </a:fld>
             <a:endParaRPr lang="en-US" dirty="0"/>
           </a:p>
@@ -8567,7 +9085,7 @@
           <a:p>
             <a:fld id="{48A87A34-81AB-432B-8DAE-1953F412C126}" type="datetimeFigureOut">
               <a:rPr lang="en-US" dirty="0"/>
-              <a:t>3/29/2021</a:t>
+              <a:t>3/30/2021</a:t>
             </a:fld>
             <a:endParaRPr lang="en-US" dirty="0"/>
           </a:p>
@@ -8732,7 +9250,7 @@
           <a:p>
             <a:fld id="{48A87A34-81AB-432B-8DAE-1953F412C126}" type="datetimeFigureOut">
               <a:rPr lang="en-US" dirty="0"/>
-              <a:t>3/29/2021</a:t>
+              <a:t>3/30/2021</a:t>
             </a:fld>
             <a:endParaRPr lang="en-US" dirty="0"/>
           </a:p>
@@ -8977,7 +9495,7 @@
           <a:p>
             <a:fld id="{48A87A34-81AB-432B-8DAE-1953F412C126}" type="datetimeFigureOut">
               <a:rPr lang="en-US" dirty="0"/>
-              <a:t>3/29/2021</a:t>
+              <a:t>3/30/2021</a:t>
             </a:fld>
             <a:endParaRPr lang="en-US" dirty="0"/>
           </a:p>
@@ -9204,7 +9722,7 @@
           <a:p>
             <a:fld id="{48A87A34-81AB-432B-8DAE-1953F412C126}" type="datetimeFigureOut">
               <a:rPr lang="en-US" dirty="0"/>
-              <a:t>3/29/2021</a:t>
+              <a:t>3/30/2021</a:t>
             </a:fld>
             <a:endParaRPr lang="en-US" dirty="0"/>
           </a:p>
@@ -9580,7 +10098,7 @@
           <a:p>
             <a:fld id="{48A87A34-81AB-432B-8DAE-1953F412C126}" type="datetimeFigureOut">
               <a:rPr lang="en-US" dirty="0"/>
-              <a:t>3/29/2021</a:t>
+              <a:t>3/30/2021</a:t>
             </a:fld>
             <a:endParaRPr lang="en-US" dirty="0"/>
           </a:p>
@@ -9693,7 +10211,7 @@
           <a:p>
             <a:fld id="{48A87A34-81AB-432B-8DAE-1953F412C126}" type="datetimeFigureOut">
               <a:rPr lang="en-US" dirty="0"/>
-              <a:t>3/29/2021</a:t>
+              <a:t>3/30/2021</a:t>
             </a:fld>
             <a:endParaRPr lang="en-US" dirty="0"/>
           </a:p>
@@ -9783,7 +10301,7 @@
           <a:p>
             <a:fld id="{48A87A34-81AB-432B-8DAE-1953F412C126}" type="datetimeFigureOut">
               <a:rPr lang="en-US" dirty="0"/>
-              <a:t>3/29/2021</a:t>
+              <a:t>3/30/2021</a:t>
             </a:fld>
             <a:endParaRPr lang="en-US" dirty="0"/>
           </a:p>
@@ -10027,7 +10545,7 @@
           <a:p>
             <a:fld id="{48A87A34-81AB-432B-8DAE-1953F412C126}" type="datetimeFigureOut">
               <a:rPr lang="en-US" dirty="0"/>
-              <a:t>3/29/2021</a:t>
+              <a:t>3/30/2021</a:t>
             </a:fld>
             <a:endParaRPr lang="en-US" dirty="0"/>
           </a:p>
@@ -10302,7 +10820,7 @@
           <a:p>
             <a:fld id="{48A87A34-81AB-432B-8DAE-1953F412C126}" type="datetimeFigureOut">
               <a:rPr lang="en-US" dirty="0"/>
-              <a:t>3/29/2021</a:t>
+              <a:t>3/30/2021</a:t>
             </a:fld>
             <a:endParaRPr lang="en-US" dirty="0"/>
           </a:p>
@@ -13375,7 +13893,7 @@
             <a:fld id="{48A87A34-81AB-432B-8DAE-1953F412C126}" type="datetimeFigureOut">
               <a:rPr lang="en-US" dirty="0"/>
               <a:pPr/>
-              <a:t>3/29/2021</a:t>
+              <a:t>3/30/2021</a:t>
             </a:fld>
             <a:endParaRPr lang="en-US" dirty="0"/>
           </a:p>
@@ -13971,15 +14489,77 @@
             <p:ph idx="1"/>
           </p:nvPr>
         </p:nvSpPr>
-        <p:spPr/>
+        <p:spPr>
+          <a:xfrm>
+            <a:off x="1141413" y="1860867"/>
+            <a:ext cx="9905999" cy="3541714"/>
+          </a:xfrm>
+        </p:spPr>
         <p:txBody>
           <a:bodyPr/>
           <a:lstStyle/>
           <a:p>
-            <a:endParaRPr lang="pl-PL"/>
+            <a:r>
+              <a:rPr lang="pl-PL" dirty="0"/>
+              <a:t>Wyrażenie lambda odnosi się do wyrażenia, które używa anonimowej funkcji zamiast zmiennej lub wartości</a:t>
+            </a:r>
+          </a:p>
+          <a:p>
+            <a:r>
+              <a:rPr lang="pl-PL" dirty="0"/>
+              <a:t>Wygodniejsze, gdy mamy prostą funkcję do użycia w jednym miejscu</a:t>
+            </a:r>
+          </a:p>
+          <a:p>
+            <a:r>
+              <a:rPr lang="pl-PL" dirty="0"/>
+              <a:t>Szybsze niż definiowanie całej funkcji </a:t>
+            </a:r>
+          </a:p>
+          <a:p>
+            <a:r>
+              <a:rPr lang="pl-PL" dirty="0"/>
+              <a:t>Potrafi iterować zbiór obiektów i dokonywać w nich transformacje</a:t>
+            </a:r>
+          </a:p>
+          <a:p>
+            <a:r>
+              <a:rPr lang="pl-PL" dirty="0"/>
+              <a:t>Bardziej czytelne</a:t>
+            </a:r>
           </a:p>
         </p:txBody>
       </p:sp>
+      <p:pic>
+        <p:nvPicPr>
+          <p:cNvPr id="5" name="Obraz 4">
+            <a:extLst>
+              <a:ext uri="{FF2B5EF4-FFF2-40B4-BE49-F238E27FC236}">
+                <a16:creationId xmlns:a16="http://schemas.microsoft.com/office/drawing/2014/main" id="{63D10E15-BD38-492F-B034-4592E8991ED7}"/>
+              </a:ext>
+            </a:extLst>
+          </p:cNvPr>
+          <p:cNvPicPr>
+            <a:picLocks noChangeAspect="1"/>
+          </p:cNvPicPr>
+          <p:nvPr/>
+        </p:nvPicPr>
+        <p:blipFill>
+          <a:blip r:embed="rId3"/>
+          <a:stretch>
+            <a:fillRect/>
+          </a:stretch>
+        </p:blipFill>
+        <p:spPr>
+          <a:xfrm>
+            <a:off x="5652874" y="4760913"/>
+            <a:ext cx="4988456" cy="1693899"/>
+          </a:xfrm>
+          <a:prstGeom prst="rect">
+            <a:avLst/>
+          </a:prstGeom>
+        </p:spPr>
+      </p:pic>
     </p:spTree>
     <p:extLst>
       <p:ext uri="{BB962C8B-B14F-4D97-AF65-F5344CB8AC3E}">
@@ -13994,6 +14574,361 @@
 </file>
 
 <file path=ppt/slides/slide11.xml><?xml version="1.0" encoding="utf-8"?>
+<p:sld xmlns:a="http://schemas.openxmlformats.org/drawingml/2006/main" xmlns:r="http://schemas.openxmlformats.org/officeDocument/2006/relationships" xmlns:p="http://schemas.openxmlformats.org/presentationml/2006/main">
+  <p:cSld>
+    <p:spTree>
+      <p:nvGrpSpPr>
+        <p:cNvPr id="1" name=""/>
+        <p:cNvGrpSpPr/>
+        <p:nvPr/>
+      </p:nvGrpSpPr>
+      <p:grpSpPr>
+        <a:xfrm>
+          <a:off x="0" y="0"/>
+          <a:ext cx="0" cy="0"/>
+          <a:chOff x="0" y="0"/>
+          <a:chExt cx="0" cy="0"/>
+        </a:xfrm>
+      </p:grpSpPr>
+      <p:sp>
+        <p:nvSpPr>
+          <p:cNvPr id="2" name="Tytuł 1">
+            <a:extLst>
+              <a:ext uri="{FF2B5EF4-FFF2-40B4-BE49-F238E27FC236}">
+                <a16:creationId xmlns:a16="http://schemas.microsoft.com/office/drawing/2014/main" id="{D4DA0D32-2558-4D6A-A87F-798A010D77B2}"/>
+              </a:ext>
+            </a:extLst>
+          </p:cNvPr>
+          <p:cNvSpPr>
+            <a:spLocks noGrp="1"/>
+          </p:cNvSpPr>
+          <p:nvPr>
+            <p:ph type="title"/>
+          </p:nvPr>
+        </p:nvSpPr>
+        <p:spPr/>
+        <p:txBody>
+          <a:bodyPr/>
+          <a:lstStyle/>
+          <a:p>
+            <a:r>
+              <a:rPr lang="pl-PL" dirty="0"/>
+              <a:t>Companion </a:t>
+            </a:r>
+            <a:r>
+              <a:rPr lang="pl-PL" dirty="0" err="1"/>
+              <a:t>objects</a:t>
+            </a:r>
+            <a:endParaRPr lang="pl-PL" dirty="0"/>
+          </a:p>
+        </p:txBody>
+      </p:sp>
+      <p:sp>
+        <p:nvSpPr>
+          <p:cNvPr id="4" name="Prostokąt 3">
+            <a:extLst>
+              <a:ext uri="{FF2B5EF4-FFF2-40B4-BE49-F238E27FC236}">
+                <a16:creationId xmlns:a16="http://schemas.microsoft.com/office/drawing/2014/main" id="{AC3E1B8F-3FED-4D8E-B283-152EC65F1998}"/>
+              </a:ext>
+            </a:extLst>
+          </p:cNvPr>
+          <p:cNvSpPr/>
+          <p:nvPr/>
+        </p:nvSpPr>
+        <p:spPr>
+          <a:xfrm>
+            <a:off x="5646420" y="1914525"/>
+            <a:ext cx="6435090" cy="3028950"/>
+          </a:xfrm>
+          <a:prstGeom prst="rect">
+            <a:avLst/>
+          </a:prstGeom>
+          <a:solidFill>
+            <a:schemeClr val="tx2">
+              <a:lumMod val="40000"/>
+              <a:lumOff val="60000"/>
+            </a:schemeClr>
+          </a:solidFill>
+        </p:spPr>
+        <p:style>
+          <a:lnRef idx="2">
+            <a:schemeClr val="accent1">
+              <a:shade val="50000"/>
+            </a:schemeClr>
+          </a:lnRef>
+          <a:fillRef idx="1">
+            <a:schemeClr val="accent1"/>
+          </a:fillRef>
+          <a:effectRef idx="0">
+            <a:schemeClr val="accent1"/>
+          </a:effectRef>
+          <a:fontRef idx="minor">
+            <a:schemeClr val="lt1"/>
+          </a:fontRef>
+        </p:style>
+        <p:txBody>
+          <a:bodyPr rtlCol="0" anchor="t" anchorCtr="0"/>
+          <a:lstStyle/>
+          <a:p>
+            <a:pPr algn="r"/>
+            <a:r>
+              <a:rPr lang="pl-PL" dirty="0" err="1">
+                <a:solidFill>
+                  <a:schemeClr val="bg1"/>
+                </a:solidFill>
+              </a:rPr>
+              <a:t>Pizza.scala</a:t>
+            </a:r>
+            <a:endParaRPr lang="pl-PL" dirty="0">
+              <a:solidFill>
+                <a:schemeClr val="bg1"/>
+              </a:solidFill>
+            </a:endParaRPr>
+          </a:p>
+        </p:txBody>
+      </p:sp>
+      <p:sp>
+        <p:nvSpPr>
+          <p:cNvPr id="3" name="Symbol zastępczy zawartości 2">
+            <a:extLst>
+              <a:ext uri="{FF2B5EF4-FFF2-40B4-BE49-F238E27FC236}">
+                <a16:creationId xmlns:a16="http://schemas.microsoft.com/office/drawing/2014/main" id="{B56DC7F1-5D4E-40B5-9441-6D034AC0EE61}"/>
+              </a:ext>
+            </a:extLst>
+          </p:cNvPr>
+          <p:cNvSpPr>
+            <a:spLocks noGrp="1"/>
+          </p:cNvSpPr>
+          <p:nvPr>
+            <p:ph idx="1"/>
+          </p:nvPr>
+        </p:nvSpPr>
+        <p:spPr>
+          <a:xfrm>
+            <a:off x="5951221" y="2249127"/>
+            <a:ext cx="2815590" cy="2287935"/>
+          </a:xfrm>
+        </p:spPr>
+        <p:txBody>
+          <a:bodyPr>
+            <a:normAutofit fontScale="92500" lnSpcReduction="20000"/>
+          </a:bodyPr>
+          <a:lstStyle/>
+          <a:p>
+            <a:pPr marL="0" indent="0">
+              <a:buNone/>
+            </a:pPr>
+            <a:r>
+              <a:rPr lang="pl-PL" b="1" i="0" dirty="0" err="1">
+                <a:solidFill>
+                  <a:srgbClr val="333333"/>
+                </a:solidFill>
+                <a:effectLst/>
+                <a:latin typeface="Consolas" panose="020B0609020204030204" pitchFamily="49" charset="0"/>
+              </a:rPr>
+              <a:t>class</a:t>
+            </a:r>
+            <a:r>
+              <a:rPr lang="pl-PL" b="0" i="0" dirty="0">
+                <a:solidFill>
+                  <a:srgbClr val="333333"/>
+                </a:solidFill>
+                <a:effectLst/>
+                <a:latin typeface="Consolas" panose="020B0609020204030204" pitchFamily="49" charset="0"/>
+              </a:rPr>
+              <a:t> </a:t>
+            </a:r>
+            <a:r>
+              <a:rPr lang="pl-PL" b="1" i="0" dirty="0">
+                <a:solidFill>
+                  <a:srgbClr val="2F8AD2"/>
+                </a:solidFill>
+                <a:effectLst/>
+                <a:latin typeface="Consolas" panose="020B0609020204030204" pitchFamily="49" charset="0"/>
+              </a:rPr>
+              <a:t>Pizza</a:t>
+            </a:r>
+            <a:r>
+              <a:rPr lang="pl-PL" b="0" i="0" dirty="0">
+                <a:solidFill>
+                  <a:srgbClr val="333333"/>
+                </a:solidFill>
+                <a:effectLst/>
+                <a:latin typeface="Consolas" panose="020B0609020204030204" pitchFamily="49" charset="0"/>
+              </a:rPr>
+              <a:t> { </a:t>
+            </a:r>
+          </a:p>
+          <a:p>
+            <a:pPr marL="0" indent="0">
+              <a:buNone/>
+            </a:pPr>
+            <a:r>
+              <a:rPr lang="pl-PL" b="0" i="0" dirty="0">
+                <a:solidFill>
+                  <a:srgbClr val="333333"/>
+                </a:solidFill>
+                <a:effectLst/>
+                <a:latin typeface="Consolas" panose="020B0609020204030204" pitchFamily="49" charset="0"/>
+              </a:rPr>
+              <a:t>} </a:t>
+            </a:r>
+          </a:p>
+          <a:p>
+            <a:pPr marL="0" indent="0">
+              <a:buNone/>
+            </a:pPr>
+            <a:endParaRPr lang="pl-PL" b="0" i="0" dirty="0">
+              <a:solidFill>
+                <a:srgbClr val="333333"/>
+              </a:solidFill>
+              <a:effectLst/>
+              <a:latin typeface="Consolas" panose="020B0609020204030204" pitchFamily="49" charset="0"/>
+            </a:endParaRPr>
+          </a:p>
+          <a:p>
+            <a:pPr marL="0" indent="0">
+              <a:buNone/>
+            </a:pPr>
+            <a:r>
+              <a:rPr lang="pl-PL" b="1" i="0" dirty="0" err="1">
+                <a:solidFill>
+                  <a:srgbClr val="333333"/>
+                </a:solidFill>
+                <a:effectLst/>
+                <a:latin typeface="Consolas" panose="020B0609020204030204" pitchFamily="49" charset="0"/>
+              </a:rPr>
+              <a:t>object</a:t>
+            </a:r>
+            <a:r>
+              <a:rPr lang="pl-PL" b="0" i="0" dirty="0">
+                <a:solidFill>
+                  <a:srgbClr val="333333"/>
+                </a:solidFill>
+                <a:effectLst/>
+                <a:latin typeface="Consolas" panose="020B0609020204030204" pitchFamily="49" charset="0"/>
+              </a:rPr>
+              <a:t> </a:t>
+            </a:r>
+            <a:r>
+              <a:rPr lang="pl-PL" b="1" i="0" dirty="0">
+                <a:solidFill>
+                  <a:srgbClr val="2F8AD2"/>
+                </a:solidFill>
+                <a:effectLst/>
+                <a:latin typeface="Consolas" panose="020B0609020204030204" pitchFamily="49" charset="0"/>
+              </a:rPr>
+              <a:t>Pizza</a:t>
+            </a:r>
+            <a:r>
+              <a:rPr lang="pl-PL" b="0" i="0" dirty="0">
+                <a:solidFill>
+                  <a:srgbClr val="333333"/>
+                </a:solidFill>
+                <a:effectLst/>
+                <a:latin typeface="Consolas" panose="020B0609020204030204" pitchFamily="49" charset="0"/>
+              </a:rPr>
+              <a:t> { </a:t>
+            </a:r>
+          </a:p>
+          <a:p>
+            <a:pPr marL="0" indent="0">
+              <a:buNone/>
+            </a:pPr>
+            <a:r>
+              <a:rPr lang="pl-PL" b="0" i="0" dirty="0">
+                <a:solidFill>
+                  <a:srgbClr val="333333"/>
+                </a:solidFill>
+                <a:effectLst/>
+                <a:latin typeface="Consolas" panose="020B0609020204030204" pitchFamily="49" charset="0"/>
+              </a:rPr>
+              <a:t>}</a:t>
+            </a:r>
+            <a:endParaRPr lang="pl-PL" dirty="0"/>
+          </a:p>
+        </p:txBody>
+      </p:sp>
+      <p:sp>
+        <p:nvSpPr>
+          <p:cNvPr id="5" name="pole tekstowe 4">
+            <a:extLst>
+              <a:ext uri="{FF2B5EF4-FFF2-40B4-BE49-F238E27FC236}">
+                <a16:creationId xmlns:a16="http://schemas.microsoft.com/office/drawing/2014/main" id="{A08D08BF-2357-4399-9DD4-126437334F5E}"/>
+              </a:ext>
+            </a:extLst>
+          </p:cNvPr>
+          <p:cNvSpPr txBox="1"/>
+          <p:nvPr/>
+        </p:nvSpPr>
+        <p:spPr>
+          <a:xfrm>
+            <a:off x="982980" y="1914525"/>
+            <a:ext cx="4149090" cy="3323987"/>
+          </a:xfrm>
+          <a:prstGeom prst="rect">
+            <a:avLst/>
+          </a:prstGeom>
+          <a:noFill/>
+        </p:spPr>
+        <p:txBody>
+          <a:bodyPr wrap="square" rtlCol="0">
+            <a:spAutoFit/>
+          </a:bodyPr>
+          <a:lstStyle/>
+          <a:p>
+            <a:pPr marL="285750" indent="-285750">
+              <a:buFont typeface="Arial" panose="020B0604020202020204" pitchFamily="34" charset="0"/>
+              <a:buChar char="•"/>
+            </a:pPr>
+            <a:r>
+              <a:rPr lang="pl-PL" sz="2400" dirty="0"/>
+              <a:t>Zadeklarowany w tym samym pliku co klasa</a:t>
+            </a:r>
+          </a:p>
+          <a:p>
+            <a:endParaRPr lang="pl-PL" sz="2400" dirty="0"/>
+          </a:p>
+          <a:p>
+            <a:pPr marL="285750" indent="-285750">
+              <a:buFont typeface="Arial" panose="020B0604020202020204" pitchFamily="34" charset="0"/>
+              <a:buChar char="•"/>
+            </a:pPr>
+            <a:r>
+              <a:rPr lang="pl-PL" sz="2400" dirty="0"/>
+              <a:t>Obiekt towarzyszący i jego klasa mogą wzajemnie uzyskiwać dostęp do swoich prywatnych elementów</a:t>
+            </a:r>
+          </a:p>
+          <a:p>
+            <a:pPr marL="285750" indent="-285750">
+              <a:buFont typeface="Arial" panose="020B0604020202020204" pitchFamily="34" charset="0"/>
+              <a:buChar char="•"/>
+            </a:pPr>
+            <a:endParaRPr lang="pl-PL" sz="2400" dirty="0"/>
+          </a:p>
+          <a:p>
+            <a:pPr marL="285750" indent="-285750">
+              <a:buFont typeface="Arial" panose="020B0604020202020204" pitchFamily="34" charset="0"/>
+              <a:buChar char="•"/>
+            </a:pPr>
+            <a:endParaRPr lang="pl-PL" dirty="0"/>
+          </a:p>
+        </p:txBody>
+      </p:sp>
+    </p:spTree>
+    <p:extLst>
+      <p:ext uri="{BB962C8B-B14F-4D97-AF65-F5344CB8AC3E}">
+        <p14:creationId xmlns:p14="http://schemas.microsoft.com/office/powerpoint/2010/main" val="3669839854"/>
+      </p:ext>
+    </p:extLst>
+  </p:cSld>
+  <p:clrMapOvr>
+    <a:masterClrMapping/>
+  </p:clrMapOvr>
+</p:sld>
+</file>
+
+<file path=ppt/slides/slide12.xml><?xml version="1.0" encoding="utf-8"?>
 <p:sld xmlns:a="http://schemas.openxmlformats.org/drawingml/2006/main" xmlns:r="http://schemas.openxmlformats.org/officeDocument/2006/relationships" xmlns:p="http://schemas.openxmlformats.org/presentationml/2006/main">
   <p:cSld>
     <p:spTree>
@@ -14032,12 +14967,16 @@
           <a:lstStyle/>
           <a:p>
             <a:r>
+              <a:rPr lang="pl-PL" dirty="0" err="1"/>
+              <a:t>Apply</a:t>
+            </a:r>
+            <a:r>
               <a:rPr lang="pl-PL" dirty="0"/>
-              <a:t>Companion </a:t>
+              <a:t> </a:t>
             </a:r>
             <a:r>
               <a:rPr lang="pl-PL" dirty="0" err="1"/>
-              <a:t>objects</a:t>
+              <a:t>method</a:t>
             </a:r>
             <a:endParaRPr lang="pl-PL" dirty="0"/>
           </a:p>
@@ -14064,7 +15003,80 @@
           <a:bodyPr/>
           <a:lstStyle/>
           <a:p>
-            <a:endParaRPr lang="pl-PL"/>
+            <a:r>
+              <a:rPr lang="pl-PL" dirty="0" err="1"/>
+              <a:t>Apply</a:t>
+            </a:r>
+            <a:r>
+              <a:rPr lang="pl-PL" dirty="0"/>
+              <a:t> </a:t>
+            </a:r>
+            <a:r>
+              <a:rPr lang="pl-PL" dirty="0" err="1"/>
+              <a:t>method</a:t>
+            </a:r>
+            <a:r>
+              <a:rPr lang="pl-PL" dirty="0"/>
+              <a:t> w obiektach towarzyszących pozwala na tworzenie obiektów bez słowa kluczowego </a:t>
+            </a:r>
+            <a:r>
+              <a:rPr lang="pl-PL" dirty="0" err="1"/>
+              <a:t>new</a:t>
+            </a:r>
+            <a:endParaRPr lang="pl-PL" dirty="0"/>
+          </a:p>
+          <a:p>
+            <a:r>
+              <a:rPr lang="pl-PL" dirty="0"/>
+              <a:t>Po zdefiniowaniu takiej metody nie trzeba jej wywoływać</a:t>
+            </a:r>
+          </a:p>
+          <a:p>
+            <a:pPr marL="0" indent="0">
+              <a:buNone/>
+            </a:pPr>
+            <a:endParaRPr lang="pl-PL" dirty="0"/>
+          </a:p>
+          <a:p>
+            <a:pPr marL="0" indent="0">
+              <a:buNone/>
+            </a:pPr>
+            <a:r>
+              <a:rPr lang="sv-SE" dirty="0"/>
+              <a:t>val p = Person("Fred Flinstone")</a:t>
+            </a:r>
+            <a:r>
+              <a:rPr lang="pl-PL" dirty="0"/>
+              <a:t> </a:t>
+            </a:r>
+            <a:r>
+              <a:rPr lang="pl-PL" b="1" dirty="0"/>
+              <a:t>=&gt;  </a:t>
+            </a:r>
+            <a:r>
+              <a:rPr lang="pl-PL" dirty="0" err="1"/>
+              <a:t>val</a:t>
+            </a:r>
+            <a:r>
+              <a:rPr lang="pl-PL" dirty="0"/>
+              <a:t> p = </a:t>
+            </a:r>
+            <a:r>
+              <a:rPr lang="pl-PL" dirty="0" err="1"/>
+              <a:t>Person.apply</a:t>
+            </a:r>
+            <a:r>
+              <a:rPr lang="pl-PL" dirty="0"/>
+              <a:t>("Fred </a:t>
+            </a:r>
+            <a:r>
+              <a:rPr lang="pl-PL" dirty="0" err="1"/>
+              <a:t>Flinstone</a:t>
+            </a:r>
+            <a:r>
+              <a:rPr lang="pl-PL" dirty="0"/>
+              <a:t>")</a:t>
+            </a:r>
           </a:p>
         </p:txBody>
       </p:sp>
@@ -14072,98 +15084,6 @@
     <p:extLst>
       <p:ext uri="{BB962C8B-B14F-4D97-AF65-F5344CB8AC3E}">
         <p14:creationId xmlns:p14="http://schemas.microsoft.com/office/powerpoint/2010/main" val="3885353049"/>
-      </p:ext>
-    </p:extLst>
-  </p:cSld>
-  <p:clrMapOvr>
-    <a:masterClrMapping/>
-  </p:clrMapOvr>
-</p:sld>
-</file>
-
-<file path=ppt/slides/slide12.xml><?xml version="1.0" encoding="utf-8"?>
-<p:sld xmlns:a="http://schemas.openxmlformats.org/drawingml/2006/main" xmlns:r="http://schemas.openxmlformats.org/officeDocument/2006/relationships" xmlns:p="http://schemas.openxmlformats.org/presentationml/2006/main">
-  <p:cSld>
-    <p:spTree>
-      <p:nvGrpSpPr>
-        <p:cNvPr id="1" name=""/>
-        <p:cNvGrpSpPr/>
-        <p:nvPr/>
-      </p:nvGrpSpPr>
-      <p:grpSpPr>
-        <a:xfrm>
-          <a:off x="0" y="0"/>
-          <a:ext cx="0" cy="0"/>
-          <a:chOff x="0" y="0"/>
-          <a:chExt cx="0" cy="0"/>
-        </a:xfrm>
-      </p:grpSpPr>
-      <p:sp>
-        <p:nvSpPr>
-          <p:cNvPr id="2" name="Tytuł 1">
-            <a:extLst>
-              <a:ext uri="{FF2B5EF4-FFF2-40B4-BE49-F238E27FC236}">
-                <a16:creationId xmlns:a16="http://schemas.microsoft.com/office/drawing/2014/main" id="{DAF0D6EC-EAEF-40FF-917D-68671705D273}"/>
-              </a:ext>
-            </a:extLst>
-          </p:cNvPr>
-          <p:cNvSpPr>
-            <a:spLocks noGrp="1"/>
-          </p:cNvSpPr>
-          <p:nvPr>
-            <p:ph type="title"/>
-          </p:nvPr>
-        </p:nvSpPr>
-        <p:spPr/>
-        <p:txBody>
-          <a:bodyPr/>
-          <a:lstStyle/>
-          <a:p>
-            <a:r>
-              <a:rPr lang="pl-PL" dirty="0" err="1"/>
-              <a:t>Apply</a:t>
-            </a:r>
-            <a:r>
-              <a:rPr lang="pl-PL" dirty="0"/>
-              <a:t> </a:t>
-            </a:r>
-            <a:r>
-              <a:rPr lang="pl-PL" dirty="0" err="1"/>
-              <a:t>method</a:t>
-            </a:r>
-            <a:endParaRPr lang="pl-PL" dirty="0"/>
-          </a:p>
-        </p:txBody>
-      </p:sp>
-      <p:sp>
-        <p:nvSpPr>
-          <p:cNvPr id="3" name="Symbol zastępczy zawartości 2">
-            <a:extLst>
-              <a:ext uri="{FF2B5EF4-FFF2-40B4-BE49-F238E27FC236}">
-                <a16:creationId xmlns:a16="http://schemas.microsoft.com/office/drawing/2014/main" id="{FE0BE18B-18DA-496A-992B-52E500F02E85}"/>
-              </a:ext>
-            </a:extLst>
-          </p:cNvPr>
-          <p:cNvSpPr>
-            <a:spLocks noGrp="1"/>
-          </p:cNvSpPr>
-          <p:nvPr>
-            <p:ph idx="1"/>
-          </p:nvPr>
-        </p:nvSpPr>
-        <p:spPr/>
-        <p:txBody>
-          <a:bodyPr/>
-          <a:lstStyle/>
-          <a:p>
-            <a:endParaRPr lang="pl-PL"/>
-          </a:p>
-        </p:txBody>
-      </p:sp>
-    </p:spTree>
-    <p:extLst>
-      <p:ext uri="{BB962C8B-B14F-4D97-AF65-F5344CB8AC3E}">
-        <p14:creationId xmlns:p14="http://schemas.microsoft.com/office/powerpoint/2010/main" val="554970537"/>
       </p:ext>
     </p:extLst>
   </p:cSld>

</xml_diff>

<commit_message>
added tests and fixes in presentation
</commit_message>
<xml_diff>
--- a/SCALA.pptx
+++ b/SCALA.pptx
@@ -234,7 +234,7 @@
           <a:p>
             <a:fld id="{C5CD1456-AA00-4668-A255-DC6FE20BE111}" type="datetimeFigureOut">
               <a:rPr lang="pl-PL" smtClean="0"/>
-              <a:t>30.03.2021</a:t>
+              <a:t>31.03.2021</a:t>
             </a:fld>
             <a:endParaRPr lang="pl-PL"/>
           </a:p>
@@ -739,51 +739,111 @@
           <a:bodyPr/>
           <a:lstStyle/>
           <a:p>
-            <a:endParaRPr lang="pl-PL" dirty="0"/>
-          </a:p>
-          <a:p>
-            <a:r>
-              <a:rPr lang="pl-PL" dirty="0"/>
+            <a:pPr>
+              <a:lnSpc>
+                <a:spcPct val="107000"/>
+              </a:lnSpc>
+              <a:spcAft>
+                <a:spcPts val="800"/>
+              </a:spcAft>
+            </a:pPr>
+            <a:r>
+              <a:rPr lang="pl-PL" sz="1800" dirty="0">
+                <a:effectLst/>
+                <a:latin typeface="Calibri" panose="020F0502020204030204" pitchFamily="34" charset="0"/>
+                <a:ea typeface="Calibri" panose="020F0502020204030204" pitchFamily="34" charset="0"/>
+                <a:cs typeface="Times New Roman" panose="02020603050405020304" pitchFamily="18" charset="0"/>
+              </a:rPr>
               <a:t>Kiedy zdefiniujemy metodę </a:t>
             </a:r>
             <a:r>
-              <a:rPr lang="pl-PL" dirty="0" err="1"/>
+              <a:rPr lang="pl-PL" sz="1800" dirty="0" err="1">
+                <a:effectLst/>
+                <a:latin typeface="Calibri" panose="020F0502020204030204" pitchFamily="34" charset="0"/>
+                <a:ea typeface="Calibri" panose="020F0502020204030204" pitchFamily="34" charset="0"/>
+                <a:cs typeface="Times New Roman" panose="02020603050405020304" pitchFamily="18" charset="0"/>
+              </a:rPr>
               <a:t>Apply</a:t>
             </a:r>
             <a:r>
-              <a:rPr lang="pl-PL" dirty="0"/>
-              <a:t> w obiekcie towarzyszącym, ma to specjalne znaczenie dla kompilatora Scala. W Scali jest tzw. cukier składniowy (</a:t>
-            </a:r>
-            <a:r>
-              <a:rPr lang="pl-PL" dirty="0" err="1"/>
+              <a:rPr lang="pl-PL" sz="1800" dirty="0">
+                <a:effectLst/>
+                <a:latin typeface="Calibri" panose="020F0502020204030204" pitchFamily="34" charset="0"/>
+                <a:ea typeface="Calibri" panose="020F0502020204030204" pitchFamily="34" charset="0"/>
+                <a:cs typeface="Times New Roman" panose="02020603050405020304" pitchFamily="18" charset="0"/>
+              </a:rPr>
+              <a:t> w obiekcie towarzyszącym, ma ona specjalne znaczenie dla kompilatora Scali. W Scali jest tzw. cukier składniowy (</a:t>
+            </a:r>
+            <a:r>
+              <a:rPr lang="pl-PL" sz="1800" dirty="0" err="1">
+                <a:effectLst/>
+                <a:latin typeface="Calibri" panose="020F0502020204030204" pitchFamily="34" charset="0"/>
+                <a:ea typeface="Calibri" panose="020F0502020204030204" pitchFamily="34" charset="0"/>
+                <a:cs typeface="Times New Roman" panose="02020603050405020304" pitchFamily="18" charset="0"/>
+              </a:rPr>
               <a:t>syntactic</a:t>
             </a:r>
             <a:r>
-              <a:rPr lang="pl-PL" dirty="0"/>
+              <a:rPr lang="pl-PL" sz="1800" dirty="0">
+                <a:effectLst/>
+                <a:latin typeface="Calibri" panose="020F0502020204030204" pitchFamily="34" charset="0"/>
+                <a:ea typeface="Calibri" panose="020F0502020204030204" pitchFamily="34" charset="0"/>
+                <a:cs typeface="Times New Roman" panose="02020603050405020304" pitchFamily="18" charset="0"/>
+              </a:rPr>
               <a:t> </a:t>
             </a:r>
             <a:r>
-              <a:rPr lang="pl-PL" dirty="0" err="1"/>
+              <a:rPr lang="pl-PL" sz="1800" dirty="0" err="1">
+                <a:effectLst/>
+                <a:latin typeface="Calibri" panose="020F0502020204030204" pitchFamily="34" charset="0"/>
+                <a:ea typeface="Calibri" panose="020F0502020204030204" pitchFamily="34" charset="0"/>
+                <a:cs typeface="Times New Roman" panose="02020603050405020304" pitchFamily="18" charset="0"/>
+              </a:rPr>
               <a:t>sugar</a:t>
             </a:r>
             <a:r>
-              <a:rPr lang="pl-PL" dirty="0"/>
-              <a:t>), który umożliwia wpisanie tego kodu [1] a podczas procesu kompilacji kompilator zamienia ten kod na [2]. Metoda </a:t>
-            </a:r>
-            <a:r>
-              <a:rPr lang="pl-PL" dirty="0" err="1"/>
+              <a:rPr lang="pl-PL" sz="1800" dirty="0">
+                <a:effectLst/>
+                <a:latin typeface="Calibri" panose="020F0502020204030204" pitchFamily="34" charset="0"/>
+                <a:ea typeface="Calibri" panose="020F0502020204030204" pitchFamily="34" charset="0"/>
+                <a:cs typeface="Times New Roman" panose="02020603050405020304" pitchFamily="18" charset="0"/>
+              </a:rPr>
+              <a:t>), który umożliwia napisanie kodu w taki sposób jak na slajdzie [1] a podczas procesu kompilacji kompilator zamienia ten kod na [2]. Dzięki temu sam zapis jest krótszy. Metoda </a:t>
+            </a:r>
+            <a:r>
+              <a:rPr lang="pl-PL" sz="1800" dirty="0" err="1">
+                <a:effectLst/>
+                <a:latin typeface="Calibri" panose="020F0502020204030204" pitchFamily="34" charset="0"/>
+                <a:ea typeface="Calibri" panose="020F0502020204030204" pitchFamily="34" charset="0"/>
+                <a:cs typeface="Times New Roman" panose="02020603050405020304" pitchFamily="18" charset="0"/>
+              </a:rPr>
               <a:t>Apply</a:t>
             </a:r>
             <a:r>
-              <a:rPr lang="pl-PL" dirty="0"/>
+              <a:rPr lang="pl-PL" sz="1800" dirty="0">
+                <a:effectLst/>
+                <a:latin typeface="Calibri" panose="020F0502020204030204" pitchFamily="34" charset="0"/>
+                <a:ea typeface="Calibri" panose="020F0502020204030204" pitchFamily="34" charset="0"/>
+                <a:cs typeface="Times New Roman" panose="02020603050405020304" pitchFamily="18" charset="0"/>
+              </a:rPr>
               <a:t> w obiekcie towarzyszącym działa jak metoda fabryki, a dzięki właśnie temu cukrowi Scala pozwala na użycie takiej składni do tworzenia nowych instancji klas bez użycia słowa kluczowego </a:t>
             </a:r>
             <a:r>
-              <a:rPr lang="pl-PL" dirty="0" err="1"/>
+              <a:rPr lang="pl-PL" sz="1800" dirty="0" err="1">
+                <a:effectLst/>
+                <a:latin typeface="Calibri" panose="020F0502020204030204" pitchFamily="34" charset="0"/>
+                <a:ea typeface="Calibri" panose="020F0502020204030204" pitchFamily="34" charset="0"/>
+                <a:cs typeface="Times New Roman" panose="02020603050405020304" pitchFamily="18" charset="0"/>
+              </a:rPr>
               <a:t>new</a:t>
             </a:r>
             <a:r>
-              <a:rPr lang="pl-PL" dirty="0"/>
+              <a:rPr lang="pl-PL" sz="1800" dirty="0">
+                <a:effectLst/>
+                <a:latin typeface="Calibri" panose="020F0502020204030204" pitchFamily="34" charset="0"/>
+                <a:ea typeface="Calibri" panose="020F0502020204030204" pitchFamily="34" charset="0"/>
+                <a:cs typeface="Times New Roman" panose="02020603050405020304" pitchFamily="18" charset="0"/>
+              </a:rPr>
               <a:t>.</a:t>
             </a:r>
           </a:p>
@@ -1518,115 +1578,181 @@
           <a:bodyPr/>
           <a:lstStyle/>
           <a:p>
-            <a:r>
-              <a:rPr lang="pl-PL" dirty="0"/>
-              <a:t>Mamy kilka sposobów tworzenia list, tak jak w sumie prawie w każdym elemencie Scali. Jeżeli nie zadeklarujemy typu listy, tak jak tutaj na zdjęciu w drugim przykładzie, to można do niej wrzucić cokolwiek.</a:t>
-            </a:r>
-          </a:p>
-          <a:p>
-            <a:r>
-              <a:rPr lang="pl-PL" dirty="0"/>
+            <a:pPr>
+              <a:lnSpc>
+                <a:spcPct val="107000"/>
+              </a:lnSpc>
+              <a:spcAft>
+                <a:spcPts val="800"/>
+              </a:spcAft>
+            </a:pPr>
+            <a:r>
+              <a:rPr lang="pl-PL" sz="1800" dirty="0">
+                <a:effectLst/>
+                <a:latin typeface="Calibri" panose="020F0502020204030204" pitchFamily="34" charset="0"/>
+                <a:ea typeface="Calibri" panose="020F0502020204030204" pitchFamily="34" charset="0"/>
+                <a:cs typeface="Times New Roman" panose="02020603050405020304" pitchFamily="18" charset="0"/>
+              </a:rPr>
+              <a:t>Listy, tak jak już mogliśmy się nie raz przekonać w Scali, można stworzyć na kilka sposobów. Zostało to pokazane na </a:t>
+            </a:r>
+            <a:r>
+              <a:rPr lang="pl-PL" sz="1800" dirty="0" err="1">
+                <a:effectLst/>
+                <a:latin typeface="Calibri" panose="020F0502020204030204" pitchFamily="34" charset="0"/>
+                <a:ea typeface="Calibri" panose="020F0502020204030204" pitchFamily="34" charset="0"/>
+                <a:cs typeface="Times New Roman" panose="02020603050405020304" pitchFamily="18" charset="0"/>
+              </a:rPr>
+              <a:t>screenshocie</a:t>
+            </a:r>
+            <a:r>
+              <a:rPr lang="pl-PL" sz="1800" dirty="0">
+                <a:effectLst/>
+                <a:latin typeface="Calibri" panose="020F0502020204030204" pitchFamily="34" charset="0"/>
+                <a:ea typeface="Calibri" panose="020F0502020204030204" pitchFamily="34" charset="0"/>
+                <a:cs typeface="Times New Roman" panose="02020603050405020304" pitchFamily="18" charset="0"/>
+              </a:rPr>
+              <a:t> - możemy podać typ elementów, jaki lista będzie przyjmować, ale nie musimy. Jeżeli nie zadeklarujemy typu listy, tak jak tutaj w drugim przykładzie, to można do niej wrzucić cokolwiek.</a:t>
+            </a:r>
+          </a:p>
+          <a:p>
+            <a:pPr>
+              <a:lnSpc>
+                <a:spcPct val="107000"/>
+              </a:lnSpc>
+              <a:spcAft>
+                <a:spcPts val="800"/>
+              </a:spcAft>
+            </a:pPr>
+            <a:r>
+              <a:rPr lang="pl-PL" sz="1800" dirty="0">
+                <a:effectLst/>
+                <a:latin typeface="Calibri" panose="020F0502020204030204" pitchFamily="34" charset="0"/>
+                <a:ea typeface="Calibri" panose="020F0502020204030204" pitchFamily="34" charset="0"/>
+                <a:cs typeface="Times New Roman" panose="02020603050405020304" pitchFamily="18" charset="0"/>
+              </a:rPr>
               <a:t>List jest z pakietu </a:t>
             </a:r>
             <a:r>
-              <a:rPr lang="pl-PL" b="0" i="0" u="sng" dirty="0" err="1">
+              <a:rPr lang="pl-PL" sz="1800" u="sng" dirty="0" err="1">
                 <a:solidFill>
-                  <a:srgbClr val="103A51"/>
+                  <a:srgbClr val="0563C1"/>
                 </a:solidFill>
                 <a:effectLst/>
-                <a:latin typeface="Arial" panose="020B0604020202020204" pitchFamily="34" charset="0"/>
-                <a:hlinkClick r:id="rId3" tooltip="scala"/>
+                <a:latin typeface="Calibri" panose="020F0502020204030204" pitchFamily="34" charset="0"/>
+                <a:ea typeface="Calibri" panose="020F0502020204030204" pitchFamily="34" charset="0"/>
+                <a:cs typeface="Times New Roman" panose="02020603050405020304" pitchFamily="18" charset="0"/>
+                <a:hlinkClick r:id="rId3"/>
               </a:rPr>
               <a:t>scala</a:t>
             </a:r>
             <a:r>
-              <a:rPr lang="pl-PL" b="0" i="0" dirty="0" err="1">
+              <a:rPr lang="pl-PL" sz="1800" dirty="0" err="1">
+                <a:effectLst/>
+                <a:latin typeface="Calibri" panose="020F0502020204030204" pitchFamily="34" charset="0"/>
+                <a:ea typeface="Calibri" panose="020F0502020204030204" pitchFamily="34" charset="0"/>
+                <a:cs typeface="Times New Roman" panose="02020603050405020304" pitchFamily="18" charset="0"/>
+              </a:rPr>
+              <a:t>.</a:t>
+            </a:r>
+            <a:r>
+              <a:rPr lang="pl-PL" sz="1800" u="sng" dirty="0" err="1">
                 <a:solidFill>
-                  <a:srgbClr val="103A51"/>
+                  <a:srgbClr val="0563C1"/>
                 </a:solidFill>
                 <a:effectLst/>
-                <a:latin typeface="Arial" panose="020B0604020202020204" pitchFamily="34" charset="0"/>
+                <a:latin typeface="Calibri" panose="020F0502020204030204" pitchFamily="34" charset="0"/>
+                <a:ea typeface="Calibri" panose="020F0502020204030204" pitchFamily="34" charset="0"/>
+                <a:cs typeface="Times New Roman" panose="02020603050405020304" pitchFamily="18" charset="0"/>
+                <a:hlinkClick r:id="rId4"/>
+              </a:rPr>
+              <a:t>collection</a:t>
+            </a:r>
+            <a:r>
+              <a:rPr lang="pl-PL" sz="1800" dirty="0" err="1">
+                <a:effectLst/>
+                <a:latin typeface="Calibri" panose="020F0502020204030204" pitchFamily="34" charset="0"/>
+                <a:ea typeface="Calibri" panose="020F0502020204030204" pitchFamily="34" charset="0"/>
+                <a:cs typeface="Times New Roman" panose="02020603050405020304" pitchFamily="18" charset="0"/>
               </a:rPr>
               <a:t>.</a:t>
             </a:r>
             <a:r>
-              <a:rPr lang="pl-PL" b="0" i="0" u="sng" dirty="0" err="1">
+              <a:rPr lang="pl-PL" sz="1800" u="sng" dirty="0" err="1">
                 <a:solidFill>
-                  <a:srgbClr val="103A51"/>
+                  <a:srgbClr val="0563C1"/>
                 </a:solidFill>
                 <a:effectLst/>
-                <a:latin typeface="Arial" panose="020B0604020202020204" pitchFamily="34" charset="0"/>
-                <a:hlinkClick r:id="rId4" tooltip="scala.collection"/>
-              </a:rPr>
-              <a:t>collection</a:t>
-            </a:r>
-            <a:r>
-              <a:rPr lang="pl-PL" b="0" i="0" dirty="0" err="1">
-                <a:solidFill>
-                  <a:srgbClr val="103A51"/>
-                </a:solidFill>
-                <a:effectLst/>
-                <a:latin typeface="Arial" panose="020B0604020202020204" pitchFamily="34" charset="0"/>
-              </a:rPr>
-              <a:t>.</a:t>
-            </a:r>
-            <a:r>
-              <a:rPr lang="pl-PL" b="0" i="0" u="sng" dirty="0" err="1">
-                <a:solidFill>
-                  <a:srgbClr val="103A51"/>
-                </a:solidFill>
-                <a:effectLst/>
-                <a:latin typeface="Arial" panose="020B0604020202020204" pitchFamily="34" charset="0"/>
-                <a:hlinkClick r:id="rId5" tooltip="scala.collection.immutable"/>
+                <a:latin typeface="Calibri" panose="020F0502020204030204" pitchFamily="34" charset="0"/>
+                <a:ea typeface="Calibri" panose="020F0502020204030204" pitchFamily="34" charset="0"/>
+                <a:cs typeface="Times New Roman" panose="02020603050405020304" pitchFamily="18" charset="0"/>
+                <a:hlinkClick r:id="rId5"/>
               </a:rPr>
               <a:t>immutable</a:t>
             </a:r>
             <a:r>
-              <a:rPr lang="pl-PL" dirty="0"/>
+              <a:rPr lang="pl-PL" sz="1800" dirty="0">
+                <a:effectLst/>
+                <a:latin typeface="Calibri" panose="020F0502020204030204" pitchFamily="34" charset="0"/>
+                <a:ea typeface="Calibri" panose="020F0502020204030204" pitchFamily="34" charset="0"/>
+                <a:cs typeface="Times New Roman" panose="02020603050405020304" pitchFamily="18" charset="0"/>
+              </a:rPr>
               <a:t>, zatem nie można ich modyfikować </a:t>
             </a:r>
           </a:p>
           <a:p>
-            <a:pPr marL="0" marR="0" lvl="0" indent="0" algn="l" defTabSz="914400" rtl="0" eaLnBrk="1" fontAlgn="auto" latinLnBrk="0" hangingPunct="1">
+            <a:pPr>
               <a:lnSpc>
-                <a:spcPct val="100000"/>
+                <a:spcPct val="107000"/>
               </a:lnSpc>
-              <a:spcBef>
-                <a:spcPts val="0"/>
-              </a:spcBef>
               <a:spcAft>
-                <a:spcPts val="0"/>
+                <a:spcPts val="800"/>
               </a:spcAft>
-              <a:buClrTx/>
-              <a:buSzTx/>
-              <a:buFontTx/>
-              <a:buNone/>
-              <a:tabLst/>
-              <a:defRPr/>
             </a:pPr>
             <a:r>
-              <a:rPr lang="pl-PL" dirty="0"/>
-              <a:t>Listy Ta klasa jest optymalna dla wzorców dostępu typu </a:t>
-            </a:r>
-            <a:r>
-              <a:rPr lang="pl-PL" dirty="0" err="1"/>
+              <a:rPr lang="pl-PL" sz="1800" dirty="0">
+                <a:effectLst/>
+                <a:latin typeface="Calibri" panose="020F0502020204030204" pitchFamily="34" charset="0"/>
+                <a:ea typeface="Calibri" panose="020F0502020204030204" pitchFamily="34" charset="0"/>
+                <a:cs typeface="Times New Roman" panose="02020603050405020304" pitchFamily="18" charset="0"/>
+              </a:rPr>
+              <a:t>Ta klasa jest optymalna dla wzorców dostępu typu </a:t>
+            </a:r>
+            <a:r>
+              <a:rPr lang="pl-PL" sz="1800" dirty="0" err="1">
+                <a:effectLst/>
+                <a:latin typeface="Calibri" panose="020F0502020204030204" pitchFamily="34" charset="0"/>
+                <a:ea typeface="Calibri" panose="020F0502020204030204" pitchFamily="34" charset="0"/>
+                <a:cs typeface="Times New Roman" panose="02020603050405020304" pitchFamily="18" charset="0"/>
+              </a:rPr>
               <a:t>last</a:t>
             </a:r>
             <a:r>
-              <a:rPr lang="pl-PL" dirty="0"/>
+              <a:rPr lang="pl-PL" sz="1800" dirty="0">
+                <a:effectLst/>
+                <a:latin typeface="Calibri" panose="020F0502020204030204" pitchFamily="34" charset="0"/>
+                <a:ea typeface="Calibri" panose="020F0502020204030204" pitchFamily="34" charset="0"/>
+                <a:cs typeface="Times New Roman" panose="02020603050405020304" pitchFamily="18" charset="0"/>
+              </a:rPr>
               <a:t>-in-</a:t>
             </a:r>
             <a:r>
-              <a:rPr lang="pl-PL" dirty="0" err="1"/>
+              <a:rPr lang="pl-PL" sz="1800" dirty="0" err="1">
+                <a:effectLst/>
+                <a:latin typeface="Calibri" panose="020F0502020204030204" pitchFamily="34" charset="0"/>
+                <a:ea typeface="Calibri" panose="020F0502020204030204" pitchFamily="34" charset="0"/>
+                <a:cs typeface="Times New Roman" panose="02020603050405020304" pitchFamily="18" charset="0"/>
+              </a:rPr>
               <a:t>first</a:t>
             </a:r>
             <a:r>
-              <a:rPr lang="pl-PL" dirty="0"/>
-              <a:t>-out (LIFO), czyli stosu. Dla innych list lepiej jest użyć innej klasy </a:t>
-            </a:r>
-          </a:p>
-          <a:p>
-            <a:endParaRPr lang="pl-PL" dirty="0"/>
+              <a:rPr lang="pl-PL" sz="1800" dirty="0">
+                <a:effectLst/>
+                <a:latin typeface="Calibri" panose="020F0502020204030204" pitchFamily="34" charset="0"/>
+                <a:ea typeface="Calibri" panose="020F0502020204030204" pitchFamily="34" charset="0"/>
+                <a:cs typeface="Times New Roman" panose="02020603050405020304" pitchFamily="18" charset="0"/>
+              </a:rPr>
+              <a:t>-out (LIFO), czyli stosu. Dla innych list lepiej jest użyć innej klasy.</a:t>
+            </a:r>
           </a:p>
         </p:txBody>
       </p:sp>
@@ -1710,57 +1836,130 @@
           <a:bodyPr/>
           <a:lstStyle/>
           <a:p>
-            <a:r>
-              <a:rPr lang="pl-PL" dirty="0"/>
+            <a:pPr>
+              <a:lnSpc>
+                <a:spcPct val="107000"/>
+              </a:lnSpc>
+              <a:spcAft>
+                <a:spcPts val="800"/>
+              </a:spcAft>
+            </a:pPr>
+            <a:r>
+              <a:rPr lang="pl-PL" sz="1800" dirty="0">
+                <a:effectLst/>
+                <a:latin typeface="Calibri" panose="020F0502020204030204" pitchFamily="34" charset="0"/>
+                <a:ea typeface="Calibri" panose="020F0502020204030204" pitchFamily="34" charset="0"/>
+                <a:cs typeface="Times New Roman" panose="02020603050405020304" pitchFamily="18" charset="0"/>
+              </a:rPr>
               <a:t>W Scali </a:t>
             </a:r>
             <a:r>
-              <a:rPr lang="pl-PL" dirty="0" err="1"/>
+              <a:rPr lang="pl-PL" sz="1800" dirty="0" err="1">
+                <a:effectLst/>
+                <a:latin typeface="Calibri" panose="020F0502020204030204" pitchFamily="34" charset="0"/>
+                <a:ea typeface="Calibri" panose="020F0502020204030204" pitchFamily="34" charset="0"/>
+                <a:cs typeface="Times New Roman" panose="02020603050405020304" pitchFamily="18" charset="0"/>
+              </a:rPr>
               <a:t>krotka</a:t>
             </a:r>
             <a:r>
-              <a:rPr lang="pl-PL" dirty="0"/>
+              <a:rPr lang="pl-PL" sz="1800" dirty="0">
+                <a:effectLst/>
+                <a:latin typeface="Calibri" panose="020F0502020204030204" pitchFamily="34" charset="0"/>
+                <a:ea typeface="Calibri" panose="020F0502020204030204" pitchFamily="34" charset="0"/>
+                <a:cs typeface="Times New Roman" panose="02020603050405020304" pitchFamily="18" charset="0"/>
+              </a:rPr>
               <a:t> to wartość zawierająca stałą liczbę elementów, każdy z własnym typem. </a:t>
             </a:r>
             <a:r>
-              <a:rPr lang="pl-PL" dirty="0" err="1"/>
+              <a:rPr lang="pl-PL" sz="1800" dirty="0" err="1">
+                <a:effectLst/>
+                <a:latin typeface="Calibri" panose="020F0502020204030204" pitchFamily="34" charset="0"/>
+                <a:ea typeface="Calibri" panose="020F0502020204030204" pitchFamily="34" charset="0"/>
+                <a:cs typeface="Times New Roman" panose="02020603050405020304" pitchFamily="18" charset="0"/>
+              </a:rPr>
               <a:t>Krotki</a:t>
             </a:r>
             <a:r>
-              <a:rPr lang="pl-PL" dirty="0"/>
-              <a:t> są niezmienne i szczególnie przydatne do zwracania wielu wartości z metody. Maksymalnie w krotce możemy mieć 22 elementy, jak spróbujemy stworzyć krotkę z większą ilością elementów to dostaniemy błąd i program się nie zbuduje. Jest ona podobnie jak lista </a:t>
-            </a:r>
-            <a:r>
-              <a:rPr lang="pl-PL" dirty="0" err="1"/>
+              <a:rPr lang="pl-PL" sz="1800" dirty="0">
+                <a:effectLst/>
+                <a:latin typeface="Calibri" panose="020F0502020204030204" pitchFamily="34" charset="0"/>
+                <a:ea typeface="Calibri" panose="020F0502020204030204" pitchFamily="34" charset="0"/>
+                <a:cs typeface="Times New Roman" panose="02020603050405020304" pitchFamily="18" charset="0"/>
+              </a:rPr>
+              <a:t> są szczególnie przydatne do zwracania kilku wartości z metody. Maksymalnie w krotce możemy mieć 22 elementy, jak spróbujemy stworzyć krotkę z większą ilością elementów to dostaniemy błąd i program się nie zbuduje. Jest ona podobnie jak lista </a:t>
+            </a:r>
+            <a:r>
+              <a:rPr lang="pl-PL" sz="1800" dirty="0" err="1">
+                <a:effectLst/>
+                <a:latin typeface="Calibri" panose="020F0502020204030204" pitchFamily="34" charset="0"/>
+                <a:ea typeface="Calibri" panose="020F0502020204030204" pitchFamily="34" charset="0"/>
+                <a:cs typeface="Times New Roman" panose="02020603050405020304" pitchFamily="18" charset="0"/>
+              </a:rPr>
               <a:t>niemutowalna</a:t>
             </a:r>
             <a:r>
-              <a:rPr lang="pl-PL" dirty="0"/>
-              <a:t>. Jednak nie jest ona z pakietu </a:t>
-            </a:r>
-            <a:r>
-              <a:rPr lang="pl-PL" dirty="0" err="1"/>
+              <a:rPr lang="pl-PL" sz="1800" dirty="0">
+                <a:effectLst/>
+                <a:latin typeface="Calibri" panose="020F0502020204030204" pitchFamily="34" charset="0"/>
+                <a:ea typeface="Calibri" panose="020F0502020204030204" pitchFamily="34" charset="0"/>
+                <a:cs typeface="Times New Roman" panose="02020603050405020304" pitchFamily="18" charset="0"/>
+              </a:rPr>
+              <a:t>. Ponadto, nie jest ona z pakietu </a:t>
+            </a:r>
+            <a:r>
+              <a:rPr lang="pl-PL" sz="1800" dirty="0" err="1">
+                <a:effectLst/>
+                <a:latin typeface="Calibri" panose="020F0502020204030204" pitchFamily="34" charset="0"/>
+                <a:ea typeface="Calibri" panose="020F0502020204030204" pitchFamily="34" charset="0"/>
+                <a:cs typeface="Times New Roman" panose="02020603050405020304" pitchFamily="18" charset="0"/>
+              </a:rPr>
               <a:t>collection</a:t>
             </a:r>
             <a:r>
-              <a:rPr lang="pl-PL" dirty="0"/>
+              <a:rPr lang="pl-PL" sz="1800" dirty="0">
+                <a:effectLst/>
+                <a:latin typeface="Calibri" panose="020F0502020204030204" pitchFamily="34" charset="0"/>
+                <a:ea typeface="Calibri" panose="020F0502020204030204" pitchFamily="34" charset="0"/>
+                <a:cs typeface="Times New Roman" panose="02020603050405020304" pitchFamily="18" charset="0"/>
+              </a:rPr>
               <a:t> zatem technicznie nie jest kolekcją. Na </a:t>
             </a:r>
             <a:r>
-              <a:rPr lang="pl-PL" dirty="0" err="1"/>
+              <a:rPr lang="pl-PL" sz="1800" dirty="0" err="1">
+                <a:effectLst/>
+                <a:latin typeface="Calibri" panose="020F0502020204030204" pitchFamily="34" charset="0"/>
+                <a:ea typeface="Calibri" panose="020F0502020204030204" pitchFamily="34" charset="0"/>
+                <a:cs typeface="Times New Roman" panose="02020603050405020304" pitchFamily="18" charset="0"/>
+              </a:rPr>
               <a:t>screenie</a:t>
             </a:r>
             <a:r>
-              <a:rPr lang="pl-PL" dirty="0"/>
+              <a:rPr lang="pl-PL" sz="1800" dirty="0">
+                <a:effectLst/>
+                <a:latin typeface="Calibri" panose="020F0502020204030204" pitchFamily="34" charset="0"/>
+                <a:ea typeface="Calibri" panose="020F0502020204030204" pitchFamily="34" charset="0"/>
+                <a:cs typeface="Times New Roman" panose="02020603050405020304" pitchFamily="18" charset="0"/>
+              </a:rPr>
               <a:t> widać jak można się odwoływać do poszczególnych elementów </a:t>
             </a:r>
             <a:r>
-              <a:rPr lang="pl-PL" dirty="0" err="1"/>
+              <a:rPr lang="pl-PL" sz="1800" dirty="0" err="1">
+                <a:effectLst/>
+                <a:latin typeface="Calibri" panose="020F0502020204030204" pitchFamily="34" charset="0"/>
+                <a:ea typeface="Calibri" panose="020F0502020204030204" pitchFamily="34" charset="0"/>
+                <a:cs typeface="Times New Roman" panose="02020603050405020304" pitchFamily="18" charset="0"/>
+              </a:rPr>
               <a:t>krotki</a:t>
             </a:r>
             <a:r>
-              <a:rPr lang="pl-PL" dirty="0"/>
-              <a:t>.</a:t>
+              <a:rPr lang="pl-PL" sz="1800" dirty="0">
+                <a:effectLst/>
+                <a:latin typeface="Calibri" panose="020F0502020204030204" pitchFamily="34" charset="0"/>
+                <a:ea typeface="Calibri" panose="020F0502020204030204" pitchFamily="34" charset="0"/>
+                <a:cs typeface="Times New Roman" panose="02020603050405020304" pitchFamily="18" charset="0"/>
+              </a:rPr>
+              <a:t>. </a:t>
             </a:r>
           </a:p>
         </p:txBody>
@@ -1845,24 +2044,42 @@
           <a:bodyPr/>
           <a:lstStyle/>
           <a:p>
-            <a:r>
-              <a:rPr lang="pl-PL" dirty="0"/>
+            <a:pPr>
+              <a:lnSpc>
+                <a:spcPct val="107000"/>
+              </a:lnSpc>
+              <a:spcAft>
+                <a:spcPts val="800"/>
+              </a:spcAft>
+            </a:pPr>
+            <a:r>
+              <a:rPr lang="pl-PL" sz="1800" dirty="0">
+                <a:effectLst/>
+                <a:latin typeface="Calibri" panose="020F0502020204030204" pitchFamily="34" charset="0"/>
+                <a:ea typeface="Calibri" panose="020F0502020204030204" pitchFamily="34" charset="0"/>
+                <a:cs typeface="Times New Roman" panose="02020603050405020304" pitchFamily="18" charset="0"/>
+              </a:rPr>
               <a:t>Wyrażenie lambda odnosi się do wyrażenia, które używa anonimowej funkcji zamiast zmiennej lub wartości. Wyrażenia lambda są wygodniejsze, gdy mamy prostą funkcję do użycia w jednym miejscu. Te wyrażenia są szybsze i bardziej czytelne niż definiowanie całej funkcji. Możemy uczynić nasze wyrażenia lambda wielokrotnego użytku dla dowolnego rodzaju przekształceń. Potrafi iterować zbiór obiektów i dokonywać w nich jakiejś transformacji. </a:t>
             </a:r>
           </a:p>
           <a:p>
-            <a:endParaRPr lang="pl-PL" dirty="0"/>
-          </a:p>
-          <a:p>
-            <a:r>
-              <a:rPr lang="pl-PL" dirty="0"/>
-              <a:t>Ponadto, funkcje lambda mogą być stosowane jak pola danej klasy, czy też na przykład użyte tylko raz, dzięki czemu nie trzeba specjalnie tworzyć nowej metody tylko </a:t>
-            </a:r>
-            <a:r>
-              <a:rPr lang="pl-PL"/>
-              <a:t>wystarczy użyć lambdy.</a:t>
-            </a:r>
-            <a:endParaRPr lang="pl-PL" dirty="0"/>
+            <a:pPr>
+              <a:lnSpc>
+                <a:spcPct val="107000"/>
+              </a:lnSpc>
+              <a:spcAft>
+                <a:spcPts val="800"/>
+              </a:spcAft>
+            </a:pPr>
+            <a:r>
+              <a:rPr lang="pl-PL" sz="1800" dirty="0">
+                <a:effectLst/>
+                <a:latin typeface="Calibri" panose="020F0502020204030204" pitchFamily="34" charset="0"/>
+                <a:ea typeface="Calibri" panose="020F0502020204030204" pitchFamily="34" charset="0"/>
+                <a:cs typeface="Times New Roman" panose="02020603050405020304" pitchFamily="18" charset="0"/>
+              </a:rPr>
+              <a:t>Ponadto, funkcje lambda mogą być stosowane jak pola danej klasy, czy też na przykład użyte tylko raz, dzięki czemu nie trzeba specjalnie tworzyć nowej metody tylko wystarczy użyć lambdy.</a:t>
+            </a:r>
           </a:p>
         </p:txBody>
       </p:sp>
@@ -1946,93 +2163,114 @@
           <a:bodyPr/>
           <a:lstStyle/>
           <a:p>
-            <a:pPr marL="0" marR="0" lvl="0" indent="0" algn="l" defTabSz="914400" rtl="0" eaLnBrk="1" fontAlgn="auto" latinLnBrk="0" hangingPunct="1">
+            <a:pPr>
               <a:lnSpc>
-                <a:spcPct val="100000"/>
+                <a:spcPct val="107000"/>
               </a:lnSpc>
-              <a:spcBef>
-                <a:spcPts val="0"/>
-              </a:spcBef>
               <a:spcAft>
-                <a:spcPts val="0"/>
+                <a:spcPts val="800"/>
               </a:spcAft>
-              <a:buClrTx/>
-              <a:buSzTx/>
-              <a:buFontTx/>
-              <a:buNone/>
-              <a:tabLst/>
-              <a:defRPr/>
             </a:pPr>
             <a:r>
-              <a:rPr lang="pl-PL" b="0" i="0" dirty="0">
-                <a:solidFill>
-                  <a:srgbClr val="4A5659"/>
-                </a:solidFill>
+              <a:rPr lang="pl-PL" sz="1800" dirty="0">
                 <a:effectLst/>
-                <a:latin typeface="Lato"/>
+                <a:latin typeface="Calibri" panose="020F0502020204030204" pitchFamily="34" charset="0"/>
+                <a:ea typeface="Calibri" panose="020F0502020204030204" pitchFamily="34" charset="0"/>
+                <a:cs typeface="Times New Roman" panose="02020603050405020304" pitchFamily="18" charset="0"/>
               </a:rPr>
               <a:t>Teraz jeszcze wspomnę o obiektach towarzyszących, czyli Companion </a:t>
             </a:r>
             <a:r>
-              <a:rPr lang="pl-PL" b="0" i="0" dirty="0" err="1">
-                <a:solidFill>
-                  <a:srgbClr val="4A5659"/>
-                </a:solidFill>
+              <a:rPr lang="pl-PL" sz="1800" dirty="0" err="1">
                 <a:effectLst/>
-                <a:latin typeface="Lato"/>
+                <a:latin typeface="Calibri" panose="020F0502020204030204" pitchFamily="34" charset="0"/>
+                <a:ea typeface="Calibri" panose="020F0502020204030204" pitchFamily="34" charset="0"/>
+                <a:cs typeface="Times New Roman" panose="02020603050405020304" pitchFamily="18" charset="0"/>
               </a:rPr>
               <a:t>objects</a:t>
             </a:r>
             <a:r>
-              <a:rPr lang="pl-PL" b="0" i="0" dirty="0">
-                <a:solidFill>
-                  <a:srgbClr val="4A5659"/>
-                </a:solidFill>
+              <a:rPr lang="pl-PL" sz="1800" dirty="0">
                 <a:effectLst/>
-                <a:latin typeface="Lato"/>
+                <a:latin typeface="Calibri" panose="020F0502020204030204" pitchFamily="34" charset="0"/>
+                <a:ea typeface="Calibri" panose="020F0502020204030204" pitchFamily="34" charset="0"/>
+                <a:cs typeface="Times New Roman" panose="02020603050405020304" pitchFamily="18" charset="0"/>
               </a:rPr>
-              <a:t>, ponieważ były już one prezentowane przez poprzednie grupy.</a:t>
-            </a:r>
-          </a:p>
-          <a:p>
-            <a:pPr marL="0" marR="0" lvl="0" indent="0" algn="l" defTabSz="914400" rtl="0" eaLnBrk="1" fontAlgn="auto" latinLnBrk="0" hangingPunct="1">
+              <a:t>, ponieważ były już one prezentowane przez poprzednie grupy, aby potem przejść do </a:t>
+            </a:r>
+            <a:r>
+              <a:rPr lang="pl-PL" sz="1800" dirty="0" err="1">
+                <a:effectLst/>
+                <a:latin typeface="Calibri" panose="020F0502020204030204" pitchFamily="34" charset="0"/>
+                <a:ea typeface="Calibri" panose="020F0502020204030204" pitchFamily="34" charset="0"/>
+                <a:cs typeface="Times New Roman" panose="02020603050405020304" pitchFamily="18" charset="0"/>
+              </a:rPr>
+              <a:t>Apply</a:t>
+            </a:r>
+            <a:r>
+              <a:rPr lang="pl-PL" sz="1800" dirty="0">
+                <a:effectLst/>
+                <a:latin typeface="Calibri" panose="020F0502020204030204" pitchFamily="34" charset="0"/>
+                <a:ea typeface="Calibri" panose="020F0502020204030204" pitchFamily="34" charset="0"/>
+                <a:cs typeface="Times New Roman" panose="02020603050405020304" pitchFamily="18" charset="0"/>
+              </a:rPr>
+              <a:t> </a:t>
+            </a:r>
+            <a:r>
+              <a:rPr lang="pl-PL" sz="1800" dirty="0" err="1">
+                <a:effectLst/>
+                <a:latin typeface="Calibri" panose="020F0502020204030204" pitchFamily="34" charset="0"/>
+                <a:ea typeface="Calibri" panose="020F0502020204030204" pitchFamily="34" charset="0"/>
+                <a:cs typeface="Times New Roman" panose="02020603050405020304" pitchFamily="18" charset="0"/>
+              </a:rPr>
+              <a:t>method</a:t>
+            </a:r>
+            <a:r>
+              <a:rPr lang="pl-PL" sz="1800" dirty="0">
+                <a:effectLst/>
+                <a:latin typeface="Calibri" panose="020F0502020204030204" pitchFamily="34" charset="0"/>
+                <a:ea typeface="Calibri" panose="020F0502020204030204" pitchFamily="34" charset="0"/>
+                <a:cs typeface="Times New Roman" panose="02020603050405020304" pitchFamily="18" charset="0"/>
+              </a:rPr>
+              <a:t>.</a:t>
+            </a:r>
+          </a:p>
+          <a:p>
+            <a:pPr>
               <a:lnSpc>
-                <a:spcPct val="100000"/>
+                <a:spcPct val="107000"/>
               </a:lnSpc>
-              <a:spcBef>
-                <a:spcPts val="0"/>
-              </a:spcBef>
               <a:spcAft>
-                <a:spcPts val="0"/>
+                <a:spcPts val="800"/>
               </a:spcAft>
-              <a:buClrTx/>
-              <a:buSzTx/>
-              <a:buFontTx/>
-              <a:buNone/>
-              <a:tabLst/>
-              <a:defRPr/>
             </a:pPr>
             <a:r>
-              <a:rPr lang="pl-PL" b="0" i="0" dirty="0">
-                <a:solidFill>
-                  <a:srgbClr val="4A5659"/>
-                </a:solidFill>
+              <a:rPr lang="pl-PL" sz="1800" dirty="0">
                 <a:effectLst/>
-                <a:latin typeface="Lato"/>
+                <a:latin typeface="Calibri" panose="020F0502020204030204" pitchFamily="34" charset="0"/>
+                <a:ea typeface="Calibri" panose="020F0502020204030204" pitchFamily="34" charset="0"/>
+                <a:cs typeface="Times New Roman" panose="02020603050405020304" pitchFamily="18" charset="0"/>
               </a:rPr>
               <a:t>Obiekt towarzyszący w Scali to obiekt zadeklarowany w tym samym pliku co klasa i mający taką samą nazwę jak klasa. Dla przykładu, z kodu na slajdzie obiekt Pizza jest traktowany jako obiekt towarzyszący klasie Pizza</a:t>
             </a:r>
           </a:p>
           <a:p>
-            <a:endParaRPr lang="pl-PL" dirty="0"/>
-          </a:p>
-          <a:p>
-            <a:endParaRPr lang="pl-PL" dirty="0"/>
-          </a:p>
-          <a:p>
-            <a:r>
-              <a:rPr lang="pl-PL" dirty="0"/>
-              <a:t>Obiekt towarzyszący i jego klasa mogą wzajemnie uzyskiwać dostęp do swoich prywatnych elementów</a:t>
+            <a:pPr>
+              <a:lnSpc>
+                <a:spcPct val="107000"/>
+              </a:lnSpc>
+              <a:spcAft>
+                <a:spcPts val="800"/>
+              </a:spcAft>
+            </a:pPr>
+            <a:r>
+              <a:rPr lang="pl-PL" sz="1800" dirty="0">
+                <a:effectLst/>
+                <a:latin typeface="Calibri" panose="020F0502020204030204" pitchFamily="34" charset="0"/>
+                <a:ea typeface="Calibri" panose="020F0502020204030204" pitchFamily="34" charset="0"/>
+                <a:cs typeface="Times New Roman" panose="02020603050405020304" pitchFamily="18" charset="0"/>
+              </a:rPr>
+              <a:t>Jedną z zalet obiektów towarzyszących i ich klas jest wzajemna widoczność swoich prywatnych elementów, mają dzięki temu do siebie dostęp.</a:t>
             </a:r>
           </a:p>
         </p:txBody>
@@ -2123,7 +2361,7 @@
           <a:noFill/>
           <a:extLst>
             <a:ext uri="{909E8E84-426E-40dd-AFC4-6F175D3DCCD1}">
-              <a14:hiddenFill xmlns="" xmlns:a14="http://schemas.microsoft.com/office/drawing/2010/main">
+              <a14:hiddenFill xmlns:a14="http://schemas.microsoft.com/office/drawing/2010/main" xmlns="">
                 <a:solidFill>
                   <a:srgbClr val="FFFFFF"/>
                 </a:solidFill>
@@ -2183,7 +2421,7 @@
             </a:ln>
             <a:extLst>
               <a:ext uri="{91240B29-F687-4f45-9708-019B960494DF}">
-                <a14:hiddenLine xmlns="" xmlns:a14="http://schemas.microsoft.com/office/drawing/2010/main" w="9525">
+                <a14:hiddenLine xmlns:a14="http://schemas.microsoft.com/office/drawing/2010/main" xmlns="" w="9525">
                   <a:solidFill>
                     <a:srgbClr val="000000"/>
                   </a:solidFill>
@@ -2273,7 +2511,7 @@
             </a:ln>
             <a:extLst>
               <a:ext uri="{91240B29-F687-4f45-9708-019B960494DF}">
-                <a14:hiddenLine xmlns="" xmlns:a14="http://schemas.microsoft.com/office/drawing/2010/main" w="9525">
+                <a14:hiddenLine xmlns:a14="http://schemas.microsoft.com/office/drawing/2010/main" xmlns="" w="9525">
                   <a:solidFill>
                     <a:srgbClr val="000000"/>
                   </a:solidFill>
@@ -2363,7 +2601,7 @@
             </a:ln>
             <a:extLst>
               <a:ext uri="{91240B29-F687-4f45-9708-019B960494DF}">
-                <a14:hiddenLine xmlns="" xmlns:a14="http://schemas.microsoft.com/office/drawing/2010/main" w="9525">
+                <a14:hiddenLine xmlns:a14="http://schemas.microsoft.com/office/drawing/2010/main" xmlns="" w="9525">
                   <a:solidFill>
                     <a:srgbClr val="000000"/>
                   </a:solidFill>
@@ -2397,7 +2635,7 @@
             </a:ln>
             <a:extLst>
               <a:ext uri="{91240B29-F687-4f45-9708-019B960494DF}">
-                <a14:hiddenLine xmlns="" xmlns:a14="http://schemas.microsoft.com/office/drawing/2010/main" w="9525">
+                <a14:hiddenLine xmlns:a14="http://schemas.microsoft.com/office/drawing/2010/main" xmlns="" w="9525">
                   <a:solidFill>
                     <a:srgbClr val="000000"/>
                   </a:solidFill>
@@ -2487,7 +2725,7 @@
             </a:ln>
             <a:extLst>
               <a:ext uri="{91240B29-F687-4f45-9708-019B960494DF}">
-                <a14:hiddenLine xmlns="" xmlns:a14="http://schemas.microsoft.com/office/drawing/2010/main" w="9525">
+                <a14:hiddenLine xmlns:a14="http://schemas.microsoft.com/office/drawing/2010/main" xmlns="" w="9525">
                   <a:solidFill>
                     <a:srgbClr val="000000"/>
                   </a:solidFill>
@@ -2549,7 +2787,7 @@
             </a:ln>
             <a:extLst>
               <a:ext uri="{91240B29-F687-4f45-9708-019B960494DF}">
-                <a14:hiddenLine xmlns="" xmlns:a14="http://schemas.microsoft.com/office/drawing/2010/main" w="9525">
+                <a14:hiddenLine xmlns:a14="http://schemas.microsoft.com/office/drawing/2010/main" xmlns="" w="9525">
                   <a:solidFill>
                     <a:srgbClr val="000000"/>
                   </a:solidFill>
@@ -2611,7 +2849,7 @@
             </a:ln>
             <a:extLst>
               <a:ext uri="{91240B29-F687-4f45-9708-019B960494DF}">
-                <a14:hiddenLine xmlns="" xmlns:a14="http://schemas.microsoft.com/office/drawing/2010/main" w="9525">
+                <a14:hiddenLine xmlns:a14="http://schemas.microsoft.com/office/drawing/2010/main" xmlns="" w="9525">
                   <a:solidFill>
                     <a:srgbClr val="000000"/>
                   </a:solidFill>
@@ -2701,7 +2939,7 @@
             </a:ln>
             <a:extLst>
               <a:ext uri="{91240B29-F687-4f45-9708-019B960494DF}">
-                <a14:hiddenLine xmlns="" xmlns:a14="http://schemas.microsoft.com/office/drawing/2010/main" w="9525">
+                <a14:hiddenLine xmlns:a14="http://schemas.microsoft.com/office/drawing/2010/main" xmlns="" w="9525">
                   <a:solidFill>
                     <a:srgbClr val="000000"/>
                   </a:solidFill>
@@ -2763,7 +3001,7 @@
             </a:ln>
             <a:extLst>
               <a:ext uri="{91240B29-F687-4f45-9708-019B960494DF}">
-                <a14:hiddenLine xmlns="" xmlns:a14="http://schemas.microsoft.com/office/drawing/2010/main" w="9525">
+                <a14:hiddenLine xmlns:a14="http://schemas.microsoft.com/office/drawing/2010/main" xmlns="" w="9525">
                   <a:solidFill>
                     <a:srgbClr val="000000"/>
                   </a:solidFill>
@@ -2825,7 +3063,7 @@
             </a:ln>
             <a:extLst>
               <a:ext uri="{91240B29-F687-4f45-9708-019B960494DF}">
-                <a14:hiddenLine xmlns="" xmlns:a14="http://schemas.microsoft.com/office/drawing/2010/main" w="9525">
+                <a14:hiddenLine xmlns:a14="http://schemas.microsoft.com/office/drawing/2010/main" xmlns="" w="9525">
                   <a:solidFill>
                     <a:srgbClr val="000000"/>
                   </a:solidFill>
@@ -2915,7 +3153,7 @@
             </a:ln>
             <a:extLst>
               <a:ext uri="{91240B29-F687-4f45-9708-019B960494DF}">
-                <a14:hiddenLine xmlns="" xmlns:a14="http://schemas.microsoft.com/office/drawing/2010/main" w="9525">
+                <a14:hiddenLine xmlns:a14="http://schemas.microsoft.com/office/drawing/2010/main" xmlns="" w="9525">
                   <a:solidFill>
                     <a:srgbClr val="000000"/>
                   </a:solidFill>
@@ -3005,7 +3243,7 @@
             </a:ln>
             <a:extLst>
               <a:ext uri="{91240B29-F687-4f45-9708-019B960494DF}">
-                <a14:hiddenLine xmlns="" xmlns:a14="http://schemas.microsoft.com/office/drawing/2010/main" w="9525">
+                <a14:hiddenLine xmlns:a14="http://schemas.microsoft.com/office/drawing/2010/main" xmlns="" w="9525">
                   <a:solidFill>
                     <a:srgbClr val="000000"/>
                   </a:solidFill>
@@ -3067,7 +3305,7 @@
             </a:ln>
             <a:extLst>
               <a:ext uri="{91240B29-F687-4f45-9708-019B960494DF}">
-                <a14:hiddenLine xmlns="" xmlns:a14="http://schemas.microsoft.com/office/drawing/2010/main" w="9525">
+                <a14:hiddenLine xmlns:a14="http://schemas.microsoft.com/office/drawing/2010/main" xmlns="" w="9525">
                   <a:solidFill>
                     <a:srgbClr val="000000"/>
                   </a:solidFill>
@@ -3177,7 +3415,7 @@
             </a:ln>
             <a:extLst>
               <a:ext uri="{91240B29-F687-4f45-9708-019B960494DF}">
-                <a14:hiddenLine xmlns="" xmlns:a14="http://schemas.microsoft.com/office/drawing/2010/main" w="9525">
+                <a14:hiddenLine xmlns:a14="http://schemas.microsoft.com/office/drawing/2010/main" xmlns="" w="9525">
                   <a:solidFill>
                     <a:srgbClr val="000000"/>
                   </a:solidFill>
@@ -3239,7 +3477,7 @@
             </a:ln>
             <a:extLst>
               <a:ext uri="{91240B29-F687-4f45-9708-019B960494DF}">
-                <a14:hiddenLine xmlns="" xmlns:a14="http://schemas.microsoft.com/office/drawing/2010/main" w="9525">
+                <a14:hiddenLine xmlns:a14="http://schemas.microsoft.com/office/drawing/2010/main" xmlns="" w="9525">
                   <a:solidFill>
                     <a:srgbClr val="000000"/>
                   </a:solidFill>
@@ -3329,7 +3567,7 @@
             </a:ln>
             <a:extLst>
               <a:ext uri="{91240B29-F687-4f45-9708-019B960494DF}">
-                <a14:hiddenLine xmlns="" xmlns:a14="http://schemas.microsoft.com/office/drawing/2010/main" w="9525">
+                <a14:hiddenLine xmlns:a14="http://schemas.microsoft.com/office/drawing/2010/main" xmlns="" w="9525">
                   <a:solidFill>
                     <a:srgbClr val="000000"/>
                   </a:solidFill>
@@ -3419,7 +3657,7 @@
             </a:ln>
             <a:extLst>
               <a:ext uri="{91240B29-F687-4f45-9708-019B960494DF}">
-                <a14:hiddenLine xmlns="" xmlns:a14="http://schemas.microsoft.com/office/drawing/2010/main" w="9525">
+                <a14:hiddenLine xmlns:a14="http://schemas.microsoft.com/office/drawing/2010/main" xmlns="" w="9525">
                   <a:solidFill>
                     <a:srgbClr val="000000"/>
                   </a:solidFill>
@@ -3481,7 +3719,7 @@
             </a:ln>
             <a:extLst>
               <a:ext uri="{91240B29-F687-4f45-9708-019B960494DF}">
-                <a14:hiddenLine xmlns="" xmlns:a14="http://schemas.microsoft.com/office/drawing/2010/main" w="9525">
+                <a14:hiddenLine xmlns:a14="http://schemas.microsoft.com/office/drawing/2010/main" xmlns="" w="9525">
                   <a:solidFill>
                     <a:srgbClr val="000000"/>
                   </a:solidFill>
@@ -3571,7 +3809,7 @@
             </a:ln>
             <a:extLst>
               <a:ext uri="{91240B29-F687-4f45-9708-019B960494DF}">
-                <a14:hiddenLine xmlns="" xmlns:a14="http://schemas.microsoft.com/office/drawing/2010/main" w="9525">
+                <a14:hiddenLine xmlns:a14="http://schemas.microsoft.com/office/drawing/2010/main" xmlns="" w="9525">
                   <a:solidFill>
                     <a:srgbClr val="000000"/>
                   </a:solidFill>
@@ -3661,7 +3899,7 @@
             </a:ln>
             <a:extLst>
               <a:ext uri="{91240B29-F687-4f45-9708-019B960494DF}">
-                <a14:hiddenLine xmlns="" xmlns:a14="http://schemas.microsoft.com/office/drawing/2010/main" w="9525">
+                <a14:hiddenLine xmlns:a14="http://schemas.microsoft.com/office/drawing/2010/main" xmlns="" w="9525">
                   <a:solidFill>
                     <a:srgbClr val="000000"/>
                   </a:solidFill>
@@ -3717,7 +3955,7 @@
             </a:ln>
             <a:extLst>
               <a:ext uri="{91240B29-F687-4f45-9708-019B960494DF}">
-                <a14:hiddenLine xmlns="" xmlns:a14="http://schemas.microsoft.com/office/drawing/2010/main" w="9525">
+                <a14:hiddenLine xmlns:a14="http://schemas.microsoft.com/office/drawing/2010/main" xmlns="" w="9525">
                   <a:solidFill>
                     <a:srgbClr val="000000"/>
                   </a:solidFill>
@@ -3807,7 +4045,7 @@
             </a:ln>
             <a:extLst>
               <a:ext uri="{91240B29-F687-4f45-9708-019B960494DF}">
-                <a14:hiddenLine xmlns="" xmlns:a14="http://schemas.microsoft.com/office/drawing/2010/main" w="9525">
+                <a14:hiddenLine xmlns:a14="http://schemas.microsoft.com/office/drawing/2010/main" xmlns="" w="9525">
                   <a:solidFill>
                     <a:srgbClr val="000000"/>
                   </a:solidFill>
@@ -3863,7 +4101,7 @@
             </a:ln>
             <a:extLst>
               <a:ext uri="{91240B29-F687-4f45-9708-019B960494DF}">
-                <a14:hiddenLine xmlns="" xmlns:a14="http://schemas.microsoft.com/office/drawing/2010/main" w="9525">
+                <a14:hiddenLine xmlns:a14="http://schemas.microsoft.com/office/drawing/2010/main" xmlns="" w="9525">
                   <a:solidFill>
                     <a:srgbClr val="000000"/>
                   </a:solidFill>
@@ -3953,7 +4191,7 @@
             </a:ln>
             <a:extLst>
               <a:ext uri="{91240B29-F687-4f45-9708-019B960494DF}">
-                <a14:hiddenLine xmlns="" xmlns:a14="http://schemas.microsoft.com/office/drawing/2010/main" w="9525">
+                <a14:hiddenLine xmlns:a14="http://schemas.microsoft.com/office/drawing/2010/main" xmlns="" w="9525">
                   <a:solidFill>
                     <a:srgbClr val="000000"/>
                   </a:solidFill>
@@ -4021,7 +4259,7 @@
             </a:ln>
             <a:extLst>
               <a:ext uri="{91240B29-F687-4f45-9708-019B960494DF}">
-                <a14:hiddenLine xmlns="" xmlns:a14="http://schemas.microsoft.com/office/drawing/2010/main" w="9525">
+                <a14:hiddenLine xmlns:a14="http://schemas.microsoft.com/office/drawing/2010/main" xmlns="" w="9525">
                   <a:solidFill>
                     <a:srgbClr val="000000"/>
                   </a:solidFill>
@@ -4111,7 +4349,7 @@
             </a:ln>
             <a:extLst>
               <a:ext uri="{91240B29-F687-4f45-9708-019B960494DF}">
-                <a14:hiddenLine xmlns="" xmlns:a14="http://schemas.microsoft.com/office/drawing/2010/main" w="9525">
+                <a14:hiddenLine xmlns:a14="http://schemas.microsoft.com/office/drawing/2010/main" xmlns="" w="9525">
                   <a:solidFill>
                     <a:srgbClr val="000000"/>
                   </a:solidFill>
@@ -4179,7 +4417,7 @@
             </a:ln>
             <a:extLst>
               <a:ext uri="{91240B29-F687-4f45-9708-019B960494DF}">
-                <a14:hiddenLine xmlns="" xmlns:a14="http://schemas.microsoft.com/office/drawing/2010/main" w="9525">
+                <a14:hiddenLine xmlns:a14="http://schemas.microsoft.com/office/drawing/2010/main" xmlns="" w="9525">
                   <a:solidFill>
                     <a:srgbClr val="000000"/>
                   </a:solidFill>
@@ -4269,7 +4507,7 @@
             </a:ln>
             <a:extLst>
               <a:ext uri="{91240B29-F687-4f45-9708-019B960494DF}">
-                <a14:hiddenLine xmlns="" xmlns:a14="http://schemas.microsoft.com/office/drawing/2010/main" w="9525">
+                <a14:hiddenLine xmlns:a14="http://schemas.microsoft.com/office/drawing/2010/main" xmlns="" w="9525">
                   <a:solidFill>
                     <a:srgbClr val="000000"/>
                   </a:solidFill>
@@ -4303,7 +4541,7 @@
             </a:ln>
             <a:extLst>
               <a:ext uri="{91240B29-F687-4f45-9708-019B960494DF}">
-                <a14:hiddenLine xmlns="" xmlns:a14="http://schemas.microsoft.com/office/drawing/2010/main" w="9525">
+                <a14:hiddenLine xmlns:a14="http://schemas.microsoft.com/office/drawing/2010/main" xmlns="" w="9525">
                   <a:solidFill>
                     <a:srgbClr val="000000"/>
                   </a:solidFill>
@@ -4393,7 +4631,7 @@
             </a:ln>
             <a:extLst>
               <a:ext uri="{91240B29-F687-4f45-9708-019B960494DF}">
-                <a14:hiddenLine xmlns="" xmlns:a14="http://schemas.microsoft.com/office/drawing/2010/main" w="9525">
+                <a14:hiddenLine xmlns:a14="http://schemas.microsoft.com/office/drawing/2010/main" xmlns="" w="9525">
                   <a:solidFill>
                     <a:srgbClr val="000000"/>
                   </a:solidFill>
@@ -4455,7 +4693,7 @@
             </a:ln>
             <a:extLst>
               <a:ext uri="{91240B29-F687-4f45-9708-019B960494DF}">
-                <a14:hiddenLine xmlns="" xmlns:a14="http://schemas.microsoft.com/office/drawing/2010/main" w="9525">
+                <a14:hiddenLine xmlns:a14="http://schemas.microsoft.com/office/drawing/2010/main" xmlns="" w="9525">
                   <a:solidFill>
                     <a:srgbClr val="000000"/>
                   </a:solidFill>
@@ -4517,7 +4755,7 @@
             </a:ln>
             <a:extLst>
               <a:ext uri="{91240B29-F687-4f45-9708-019B960494DF}">
-                <a14:hiddenLine xmlns="" xmlns:a14="http://schemas.microsoft.com/office/drawing/2010/main" w="9525">
+                <a14:hiddenLine xmlns:a14="http://schemas.microsoft.com/office/drawing/2010/main" xmlns="" w="9525">
                   <a:solidFill>
                     <a:srgbClr val="000000"/>
                   </a:solidFill>
@@ -4607,7 +4845,7 @@
             </a:ln>
             <a:extLst>
               <a:ext uri="{91240B29-F687-4f45-9708-019B960494DF}">
-                <a14:hiddenLine xmlns="" xmlns:a14="http://schemas.microsoft.com/office/drawing/2010/main" w="9525">
+                <a14:hiddenLine xmlns:a14="http://schemas.microsoft.com/office/drawing/2010/main" xmlns="" w="9525">
                   <a:solidFill>
                     <a:srgbClr val="000000"/>
                   </a:solidFill>
@@ -4675,7 +4913,7 @@
             </a:ln>
             <a:extLst>
               <a:ext uri="{91240B29-F687-4f45-9708-019B960494DF}">
-                <a14:hiddenLine xmlns="" xmlns:a14="http://schemas.microsoft.com/office/drawing/2010/main" w="9525">
+                <a14:hiddenLine xmlns:a14="http://schemas.microsoft.com/office/drawing/2010/main" xmlns="" w="9525">
                   <a:solidFill>
                     <a:srgbClr val="000000"/>
                   </a:solidFill>
@@ -4737,7 +4975,7 @@
             </a:ln>
             <a:extLst>
               <a:ext uri="{91240B29-F687-4f45-9708-019B960494DF}">
-                <a14:hiddenLine xmlns="" xmlns:a14="http://schemas.microsoft.com/office/drawing/2010/main" w="9525">
+                <a14:hiddenLine xmlns:a14="http://schemas.microsoft.com/office/drawing/2010/main" xmlns="" w="9525">
                   <a:solidFill>
                     <a:srgbClr val="000000"/>
                   </a:solidFill>
@@ -4827,7 +5065,7 @@
             </a:ln>
             <a:extLst>
               <a:ext uri="{91240B29-F687-4f45-9708-019B960494DF}">
-                <a14:hiddenLine xmlns="" xmlns:a14="http://schemas.microsoft.com/office/drawing/2010/main" w="9525">
+                <a14:hiddenLine xmlns:a14="http://schemas.microsoft.com/office/drawing/2010/main" xmlns="" w="9525">
                   <a:solidFill>
                     <a:srgbClr val="000000"/>
                   </a:solidFill>
@@ -4889,7 +5127,7 @@
             </a:ln>
             <a:extLst>
               <a:ext uri="{91240B29-F687-4f45-9708-019B960494DF}">
-                <a14:hiddenLine xmlns="" xmlns:a14="http://schemas.microsoft.com/office/drawing/2010/main" w="9525">
+                <a14:hiddenLine xmlns:a14="http://schemas.microsoft.com/office/drawing/2010/main" xmlns="" w="9525">
                   <a:solidFill>
                     <a:srgbClr val="000000"/>
                   </a:solidFill>
@@ -4979,7 +5217,7 @@
             </a:ln>
             <a:extLst>
               <a:ext uri="{91240B29-F687-4f45-9708-019B960494DF}">
-                <a14:hiddenLine xmlns="" xmlns:a14="http://schemas.microsoft.com/office/drawing/2010/main" w="9525">
+                <a14:hiddenLine xmlns:a14="http://schemas.microsoft.com/office/drawing/2010/main" xmlns="" w="9525">
                   <a:solidFill>
                     <a:srgbClr val="000000"/>
                   </a:solidFill>
@@ -5041,7 +5279,7 @@
             </a:ln>
             <a:extLst>
               <a:ext uri="{91240B29-F687-4f45-9708-019B960494DF}">
-                <a14:hiddenLine xmlns="" xmlns:a14="http://schemas.microsoft.com/office/drawing/2010/main" w="9525">
+                <a14:hiddenLine xmlns:a14="http://schemas.microsoft.com/office/drawing/2010/main" xmlns="" w="9525">
                   <a:solidFill>
                     <a:srgbClr val="000000"/>
                   </a:solidFill>
@@ -5131,7 +5369,7 @@
             </a:ln>
             <a:extLst>
               <a:ext uri="{91240B29-F687-4f45-9708-019B960494DF}">
-                <a14:hiddenLine xmlns="" xmlns:a14="http://schemas.microsoft.com/office/drawing/2010/main" w="9525">
+                <a14:hiddenLine xmlns:a14="http://schemas.microsoft.com/office/drawing/2010/main" xmlns="" w="9525">
                   <a:solidFill>
                     <a:srgbClr val="000000"/>
                   </a:solidFill>
@@ -5165,7 +5403,7 @@
             </a:ln>
             <a:extLst>
               <a:ext uri="{91240B29-F687-4f45-9708-019B960494DF}">
-                <a14:hiddenLine xmlns="" xmlns:a14="http://schemas.microsoft.com/office/drawing/2010/main" w="9525">
+                <a14:hiddenLine xmlns:a14="http://schemas.microsoft.com/office/drawing/2010/main" xmlns="" w="9525">
                   <a:solidFill>
                     <a:srgbClr val="000000"/>
                   </a:solidFill>
@@ -5230,7 +5468,7 @@
             </a:ln>
             <a:extLst>
               <a:ext uri="{91240B29-F687-4f45-9708-019B960494DF}">
-                <a14:hiddenLine xmlns="" xmlns:a14="http://schemas.microsoft.com/office/drawing/2010/main" w="9525">
+                <a14:hiddenLine xmlns:a14="http://schemas.microsoft.com/office/drawing/2010/main" xmlns="" w="9525">
                   <a:solidFill>
                     <a:srgbClr val="000000"/>
                   </a:solidFill>
@@ -5320,7 +5558,7 @@
             </a:ln>
             <a:extLst>
               <a:ext uri="{91240B29-F687-4f45-9708-019B960494DF}">
-                <a14:hiddenLine xmlns="" xmlns:a14="http://schemas.microsoft.com/office/drawing/2010/main" w="9525">
+                <a14:hiddenLine xmlns:a14="http://schemas.microsoft.com/office/drawing/2010/main" xmlns="" w="9525">
                   <a:solidFill>
                     <a:srgbClr val="000000"/>
                   </a:solidFill>
@@ -5382,7 +5620,7 @@
             </a:ln>
             <a:extLst>
               <a:ext uri="{91240B29-F687-4f45-9708-019B960494DF}">
-                <a14:hiddenLine xmlns="" xmlns:a14="http://schemas.microsoft.com/office/drawing/2010/main" w="9525">
+                <a14:hiddenLine xmlns:a14="http://schemas.microsoft.com/office/drawing/2010/main" xmlns="" w="9525">
                   <a:solidFill>
                     <a:srgbClr val="000000"/>
                   </a:solidFill>
@@ -5472,7 +5710,7 @@
             </a:ln>
             <a:extLst>
               <a:ext uri="{91240B29-F687-4f45-9708-019B960494DF}">
-                <a14:hiddenLine xmlns="" xmlns:a14="http://schemas.microsoft.com/office/drawing/2010/main" w="9525">
+                <a14:hiddenLine xmlns:a14="http://schemas.microsoft.com/office/drawing/2010/main" xmlns="" w="9525">
                   <a:solidFill>
                     <a:srgbClr val="000000"/>
                   </a:solidFill>
@@ -5562,7 +5800,7 @@
             </a:ln>
             <a:extLst>
               <a:ext uri="{91240B29-F687-4f45-9708-019B960494DF}">
-                <a14:hiddenLine xmlns="" xmlns:a14="http://schemas.microsoft.com/office/drawing/2010/main" w="9525">
+                <a14:hiddenLine xmlns:a14="http://schemas.microsoft.com/office/drawing/2010/main" xmlns="" w="9525">
                   <a:solidFill>
                     <a:srgbClr val="000000"/>
                   </a:solidFill>
@@ -5627,7 +5865,7 @@
             </a:ln>
             <a:extLst>
               <a:ext uri="{91240B29-F687-4f45-9708-019B960494DF}">
-                <a14:hiddenLine xmlns="" xmlns:a14="http://schemas.microsoft.com/office/drawing/2010/main" w="9525">
+                <a14:hiddenLine xmlns:a14="http://schemas.microsoft.com/office/drawing/2010/main" xmlns="" w="9525">
                   <a:solidFill>
                     <a:srgbClr val="000000"/>
                   </a:solidFill>
@@ -5689,7 +5927,7 @@
             </a:ln>
             <a:extLst>
               <a:ext uri="{91240B29-F687-4f45-9708-019B960494DF}">
-                <a14:hiddenLine xmlns="" xmlns:a14="http://schemas.microsoft.com/office/drawing/2010/main" w="9525">
+                <a14:hiddenLine xmlns:a14="http://schemas.microsoft.com/office/drawing/2010/main" xmlns="" w="9525">
                   <a:solidFill>
                     <a:srgbClr val="000000"/>
                   </a:solidFill>
@@ -5779,7 +6017,7 @@
             </a:ln>
             <a:extLst>
               <a:ext uri="{91240B29-F687-4f45-9708-019B960494DF}">
-                <a14:hiddenLine xmlns="" xmlns:a14="http://schemas.microsoft.com/office/drawing/2010/main" w="9525">
+                <a14:hiddenLine xmlns:a14="http://schemas.microsoft.com/office/drawing/2010/main" xmlns="" w="9525">
                   <a:solidFill>
                     <a:srgbClr val="000000"/>
                   </a:solidFill>
@@ -5869,7 +6107,7 @@
             </a:ln>
             <a:extLst>
               <a:ext uri="{91240B29-F687-4f45-9708-019B960494DF}">
-                <a14:hiddenLine xmlns="" xmlns:a14="http://schemas.microsoft.com/office/drawing/2010/main" w="9525">
+                <a14:hiddenLine xmlns:a14="http://schemas.microsoft.com/office/drawing/2010/main" xmlns="" w="9525">
                   <a:solidFill>
                     <a:srgbClr val="000000"/>
                   </a:solidFill>
@@ -5931,7 +6169,7 @@
             </a:ln>
             <a:extLst>
               <a:ext uri="{91240B29-F687-4f45-9708-019B960494DF}">
-                <a14:hiddenLine xmlns="" xmlns:a14="http://schemas.microsoft.com/office/drawing/2010/main" w="9525">
+                <a14:hiddenLine xmlns:a14="http://schemas.microsoft.com/office/drawing/2010/main" xmlns="" w="9525">
                   <a:solidFill>
                     <a:srgbClr val="000000"/>
                   </a:solidFill>
@@ -6051,7 +6289,7 @@
             </a:ln>
             <a:extLst>
               <a:ext uri="{91240B29-F687-4f45-9708-019B960494DF}">
-                <a14:hiddenLine xmlns="" xmlns:a14="http://schemas.microsoft.com/office/drawing/2010/main" w="9525">
+                <a14:hiddenLine xmlns:a14="http://schemas.microsoft.com/office/drawing/2010/main" xmlns="" w="9525">
                   <a:solidFill>
                     <a:srgbClr val="000000"/>
                   </a:solidFill>
@@ -6119,7 +6357,7 @@
             </a:ln>
             <a:extLst>
               <a:ext uri="{91240B29-F687-4f45-9708-019B960494DF}">
-                <a14:hiddenLine xmlns="" xmlns:a14="http://schemas.microsoft.com/office/drawing/2010/main" w="9525">
+                <a14:hiddenLine xmlns:a14="http://schemas.microsoft.com/office/drawing/2010/main" xmlns="" w="9525">
                   <a:solidFill>
                     <a:srgbClr val="000000"/>
                   </a:solidFill>
@@ -6209,7 +6447,7 @@
             </a:ln>
             <a:extLst>
               <a:ext uri="{91240B29-F687-4f45-9708-019B960494DF}">
-                <a14:hiddenLine xmlns="" xmlns:a14="http://schemas.microsoft.com/office/drawing/2010/main" w="9525">
+                <a14:hiddenLine xmlns:a14="http://schemas.microsoft.com/office/drawing/2010/main" xmlns="" w="9525">
                   <a:solidFill>
                     <a:srgbClr val="000000"/>
                   </a:solidFill>
@@ -6349,7 +6587,7 @@
           <a:p>
             <a:fld id="{48A87A34-81AB-432B-8DAE-1953F412C126}" type="datetimeFigureOut">
               <a:rPr lang="en-US" dirty="0"/>
-              <a:t>3/30/2021</a:t>
+              <a:t>3/31/2021</a:t>
             </a:fld>
             <a:endParaRPr lang="en-US" dirty="0"/>
           </a:p>
@@ -6611,7 +6849,7 @@
           <a:p>
             <a:fld id="{48A87A34-81AB-432B-8DAE-1953F412C126}" type="datetimeFigureOut">
               <a:rPr lang="en-US" dirty="0"/>
-              <a:t>3/30/2021</a:t>
+              <a:t>3/31/2021</a:t>
             </a:fld>
             <a:endParaRPr lang="en-US" dirty="0"/>
           </a:p>
@@ -6802,7 +7040,7 @@
           <a:p>
             <a:fld id="{48A87A34-81AB-432B-8DAE-1953F412C126}" type="datetimeFigureOut">
               <a:rPr lang="en-US" dirty="0"/>
-              <a:t>3/30/2021</a:t>
+              <a:t>3/31/2021</a:t>
             </a:fld>
             <a:endParaRPr lang="en-US" dirty="0"/>
           </a:p>
@@ -7060,7 +7298,7 @@
           <a:p>
             <a:fld id="{48A87A34-81AB-432B-8DAE-1953F412C126}" type="datetimeFigureOut">
               <a:rPr lang="en-US" dirty="0"/>
-              <a:t>3/30/2021</a:t>
+              <a:t>3/31/2021</a:t>
             </a:fld>
             <a:endParaRPr lang="en-US" dirty="0"/>
           </a:p>
@@ -7489,7 +7727,7 @@
           <a:p>
             <a:fld id="{48A87A34-81AB-432B-8DAE-1953F412C126}" type="datetimeFigureOut">
               <a:rPr lang="en-US" dirty="0"/>
-              <a:t>3/30/2021</a:t>
+              <a:t>3/31/2021</a:t>
             </a:fld>
             <a:endParaRPr lang="en-US" dirty="0"/>
           </a:p>
@@ -8030,7 +8268,7 @@
           <a:p>
             <a:fld id="{48A87A34-81AB-432B-8DAE-1953F412C126}" type="datetimeFigureOut">
               <a:rPr lang="en-US" dirty="0"/>
-              <a:t>3/30/2021</a:t>
+              <a:t>3/31/2021</a:t>
             </a:fld>
             <a:endParaRPr lang="en-US" dirty="0"/>
           </a:p>
@@ -8745,7 +8983,7 @@
           <a:p>
             <a:fld id="{48A87A34-81AB-432B-8DAE-1953F412C126}" type="datetimeFigureOut">
               <a:rPr lang="en-US" dirty="0"/>
-              <a:t>3/30/2021</a:t>
+              <a:t>3/31/2021</a:t>
             </a:fld>
             <a:endParaRPr lang="en-US" dirty="0"/>
           </a:p>
@@ -8910,7 +9148,7 @@
           <a:p>
             <a:fld id="{48A87A34-81AB-432B-8DAE-1953F412C126}" type="datetimeFigureOut">
               <a:rPr lang="en-US" dirty="0"/>
-              <a:t>3/30/2021</a:t>
+              <a:t>3/31/2021</a:t>
             </a:fld>
             <a:endParaRPr lang="en-US" dirty="0"/>
           </a:p>
@@ -9085,7 +9323,7 @@
           <a:p>
             <a:fld id="{48A87A34-81AB-432B-8DAE-1953F412C126}" type="datetimeFigureOut">
               <a:rPr lang="en-US" dirty="0"/>
-              <a:t>3/30/2021</a:t>
+              <a:t>3/31/2021</a:t>
             </a:fld>
             <a:endParaRPr lang="en-US" dirty="0"/>
           </a:p>
@@ -9250,7 +9488,7 @@
           <a:p>
             <a:fld id="{48A87A34-81AB-432B-8DAE-1953F412C126}" type="datetimeFigureOut">
               <a:rPr lang="en-US" dirty="0"/>
-              <a:t>3/30/2021</a:t>
+              <a:t>3/31/2021</a:t>
             </a:fld>
             <a:endParaRPr lang="en-US" dirty="0"/>
           </a:p>
@@ -9495,7 +9733,7 @@
           <a:p>
             <a:fld id="{48A87A34-81AB-432B-8DAE-1953F412C126}" type="datetimeFigureOut">
               <a:rPr lang="en-US" dirty="0"/>
-              <a:t>3/30/2021</a:t>
+              <a:t>3/31/2021</a:t>
             </a:fld>
             <a:endParaRPr lang="en-US" dirty="0"/>
           </a:p>
@@ -9722,7 +9960,7 @@
           <a:p>
             <a:fld id="{48A87A34-81AB-432B-8DAE-1953F412C126}" type="datetimeFigureOut">
               <a:rPr lang="en-US" dirty="0"/>
-              <a:t>3/30/2021</a:t>
+              <a:t>3/31/2021</a:t>
             </a:fld>
             <a:endParaRPr lang="en-US" dirty="0"/>
           </a:p>
@@ -10098,7 +10336,7 @@
           <a:p>
             <a:fld id="{48A87A34-81AB-432B-8DAE-1953F412C126}" type="datetimeFigureOut">
               <a:rPr lang="en-US" dirty="0"/>
-              <a:t>3/30/2021</a:t>
+              <a:t>3/31/2021</a:t>
             </a:fld>
             <a:endParaRPr lang="en-US" dirty="0"/>
           </a:p>
@@ -10211,7 +10449,7 @@
           <a:p>
             <a:fld id="{48A87A34-81AB-432B-8DAE-1953F412C126}" type="datetimeFigureOut">
               <a:rPr lang="en-US" dirty="0"/>
-              <a:t>3/30/2021</a:t>
+              <a:t>3/31/2021</a:t>
             </a:fld>
             <a:endParaRPr lang="en-US" dirty="0"/>
           </a:p>
@@ -10301,7 +10539,7 @@
           <a:p>
             <a:fld id="{48A87A34-81AB-432B-8DAE-1953F412C126}" type="datetimeFigureOut">
               <a:rPr lang="en-US" dirty="0"/>
-              <a:t>3/30/2021</a:t>
+              <a:t>3/31/2021</a:t>
             </a:fld>
             <a:endParaRPr lang="en-US" dirty="0"/>
           </a:p>
@@ -10545,7 +10783,7 @@
           <a:p>
             <a:fld id="{48A87A34-81AB-432B-8DAE-1953F412C126}" type="datetimeFigureOut">
               <a:rPr lang="en-US" dirty="0"/>
-              <a:t>3/30/2021</a:t>
+              <a:t>3/31/2021</a:t>
             </a:fld>
             <a:endParaRPr lang="en-US" dirty="0"/>
           </a:p>
@@ -10820,7 +11058,7 @@
           <a:p>
             <a:fld id="{48A87A34-81AB-432B-8DAE-1953F412C126}" type="datetimeFigureOut">
               <a:rPr lang="en-US" dirty="0"/>
-              <a:t>3/30/2021</a:t>
+              <a:t>3/31/2021</a:t>
             </a:fld>
             <a:endParaRPr lang="en-US" dirty="0"/>
           </a:p>
@@ -10931,7 +11169,7 @@
           <a:noFill/>
           <a:extLst>
             <a:ext uri="{909E8E84-426E-40dd-AFC4-6F175D3DCCD1}">
-              <a14:hiddenFill xmlns="" xmlns:a14="http://schemas.microsoft.com/office/drawing/2010/main">
+              <a14:hiddenFill xmlns:a14="http://schemas.microsoft.com/office/drawing/2010/main" xmlns="">
                 <a:solidFill>
                   <a:srgbClr val="FFFFFF"/>
                 </a:solidFill>
@@ -11005,7 +11243,7 @@
               </a:ln>
               <a:extLst>
                 <a:ext uri="{91240B29-F687-4f45-9708-019B960494DF}">
-                  <a14:hiddenLine xmlns="" xmlns:a14="http://schemas.microsoft.com/office/drawing/2010/main" w="9525">
+                  <a14:hiddenLine xmlns:a14="http://schemas.microsoft.com/office/drawing/2010/main" xmlns="" w="9525">
                     <a:solidFill>
                       <a:srgbClr val="000000"/>
                     </a:solidFill>
@@ -11095,7 +11333,7 @@
               </a:ln>
               <a:extLst>
                 <a:ext uri="{91240B29-F687-4f45-9708-019B960494DF}">
-                  <a14:hiddenLine xmlns="" xmlns:a14="http://schemas.microsoft.com/office/drawing/2010/main" w="9525">
+                  <a14:hiddenLine xmlns:a14="http://schemas.microsoft.com/office/drawing/2010/main" xmlns="" w="9525">
                     <a:solidFill>
                       <a:srgbClr val="000000"/>
                     </a:solidFill>
@@ -11185,7 +11423,7 @@
               </a:ln>
               <a:extLst>
                 <a:ext uri="{91240B29-F687-4f45-9708-019B960494DF}">
-                  <a14:hiddenLine xmlns="" xmlns:a14="http://schemas.microsoft.com/office/drawing/2010/main" w="9525">
+                  <a14:hiddenLine xmlns:a14="http://schemas.microsoft.com/office/drawing/2010/main" xmlns="" w="9525">
                     <a:solidFill>
                       <a:srgbClr val="000000"/>
                     </a:solidFill>
@@ -11247,7 +11485,7 @@
               </a:ln>
               <a:extLst>
                 <a:ext uri="{91240B29-F687-4f45-9708-019B960494DF}">
-                  <a14:hiddenLine xmlns="" xmlns:a14="http://schemas.microsoft.com/office/drawing/2010/main" w="9525">
+                  <a14:hiddenLine xmlns:a14="http://schemas.microsoft.com/office/drawing/2010/main" xmlns="" w="9525">
                     <a:solidFill>
                       <a:srgbClr val="000000"/>
                     </a:solidFill>
@@ -11337,7 +11575,7 @@
               </a:ln>
               <a:extLst>
                 <a:ext uri="{91240B29-F687-4f45-9708-019B960494DF}">
-                  <a14:hiddenLine xmlns="" xmlns:a14="http://schemas.microsoft.com/office/drawing/2010/main" w="9525">
+                  <a14:hiddenLine xmlns:a14="http://schemas.microsoft.com/office/drawing/2010/main" xmlns="" w="9525">
                     <a:solidFill>
                       <a:srgbClr val="000000"/>
                     </a:solidFill>
@@ -11399,7 +11637,7 @@
               </a:ln>
               <a:extLst>
                 <a:ext uri="{91240B29-F687-4f45-9708-019B960494DF}">
-                  <a14:hiddenLine xmlns="" xmlns:a14="http://schemas.microsoft.com/office/drawing/2010/main" w="9525">
+                  <a14:hiddenLine xmlns:a14="http://schemas.microsoft.com/office/drawing/2010/main" xmlns="" w="9525">
                     <a:solidFill>
                       <a:srgbClr val="000000"/>
                     </a:solidFill>
@@ -11461,7 +11699,7 @@
               </a:ln>
               <a:extLst>
                 <a:ext uri="{91240B29-F687-4f45-9708-019B960494DF}">
-                  <a14:hiddenLine xmlns="" xmlns:a14="http://schemas.microsoft.com/office/drawing/2010/main" w="9525">
+                  <a14:hiddenLine xmlns:a14="http://schemas.microsoft.com/office/drawing/2010/main" xmlns="" w="9525">
                     <a:solidFill>
                       <a:srgbClr val="000000"/>
                     </a:solidFill>
@@ -11551,7 +11789,7 @@
               </a:ln>
               <a:extLst>
                 <a:ext uri="{91240B29-F687-4f45-9708-019B960494DF}">
-                  <a14:hiddenLine xmlns="" xmlns:a14="http://schemas.microsoft.com/office/drawing/2010/main" w="9525">
+                  <a14:hiddenLine xmlns:a14="http://schemas.microsoft.com/office/drawing/2010/main" xmlns="" w="9525">
                     <a:solidFill>
                       <a:srgbClr val="000000"/>
                     </a:solidFill>
@@ -11641,7 +11879,7 @@
               </a:ln>
               <a:extLst>
                 <a:ext uri="{91240B29-F687-4f45-9708-019B960494DF}">
-                  <a14:hiddenLine xmlns="" xmlns:a14="http://schemas.microsoft.com/office/drawing/2010/main" w="9525">
+                  <a14:hiddenLine xmlns:a14="http://schemas.microsoft.com/office/drawing/2010/main" xmlns="" w="9525">
                     <a:solidFill>
                       <a:srgbClr val="000000"/>
                     </a:solidFill>
@@ -11703,7 +11941,7 @@
               </a:ln>
               <a:extLst>
                 <a:ext uri="{91240B29-F687-4f45-9708-019B960494DF}">
-                  <a14:hiddenLine xmlns="" xmlns:a14="http://schemas.microsoft.com/office/drawing/2010/main" w="9525">
+                  <a14:hiddenLine xmlns:a14="http://schemas.microsoft.com/office/drawing/2010/main" xmlns="" w="9525">
                     <a:solidFill>
                       <a:srgbClr val="000000"/>
                     </a:solidFill>
@@ -11813,7 +12051,7 @@
               </a:ln>
               <a:extLst>
                 <a:ext uri="{91240B29-F687-4f45-9708-019B960494DF}">
-                  <a14:hiddenLine xmlns="" xmlns:a14="http://schemas.microsoft.com/office/drawing/2010/main" w="9525">
+                  <a14:hiddenLine xmlns:a14="http://schemas.microsoft.com/office/drawing/2010/main" xmlns="" w="9525">
                     <a:solidFill>
                       <a:srgbClr val="000000"/>
                     </a:solidFill>
@@ -11897,7 +12135,7 @@
               </a:ln>
               <a:extLst>
                 <a:ext uri="{91240B29-F687-4f45-9708-019B960494DF}">
-                  <a14:hiddenLine xmlns="" xmlns:a14="http://schemas.microsoft.com/office/drawing/2010/main" w="9525">
+                  <a14:hiddenLine xmlns:a14="http://schemas.microsoft.com/office/drawing/2010/main" xmlns="" w="9525">
                     <a:solidFill>
                       <a:srgbClr val="000000"/>
                     </a:solidFill>
@@ -11959,7 +12197,7 @@
               </a:ln>
               <a:extLst>
                 <a:ext uri="{91240B29-F687-4f45-9708-019B960494DF}">
-                  <a14:hiddenLine xmlns="" xmlns:a14="http://schemas.microsoft.com/office/drawing/2010/main" w="9525">
+                  <a14:hiddenLine xmlns:a14="http://schemas.microsoft.com/office/drawing/2010/main" xmlns="" w="9525">
                     <a:solidFill>
                       <a:srgbClr val="000000"/>
                     </a:solidFill>
@@ -12021,7 +12259,7 @@
               </a:ln>
               <a:extLst>
                 <a:ext uri="{91240B29-F687-4f45-9708-019B960494DF}">
-                  <a14:hiddenLine xmlns="" xmlns:a14="http://schemas.microsoft.com/office/drawing/2010/main" w="9525">
+                  <a14:hiddenLine xmlns:a14="http://schemas.microsoft.com/office/drawing/2010/main" xmlns="" w="9525">
                     <a:solidFill>
                       <a:srgbClr val="000000"/>
                     </a:solidFill>
@@ -12111,7 +12349,7 @@
               </a:ln>
               <a:extLst>
                 <a:ext uri="{91240B29-F687-4f45-9708-019B960494DF}">
-                  <a14:hiddenLine xmlns="" xmlns:a14="http://schemas.microsoft.com/office/drawing/2010/main" w="9525">
+                  <a14:hiddenLine xmlns:a14="http://schemas.microsoft.com/office/drawing/2010/main" xmlns="" w="9525">
                     <a:solidFill>
                       <a:srgbClr val="000000"/>
                     </a:solidFill>
@@ -12145,7 +12383,7 @@
               </a:ln>
               <a:extLst>
                 <a:ext uri="{91240B29-F687-4f45-9708-019B960494DF}">
-                  <a14:hiddenLine xmlns="" xmlns:a14="http://schemas.microsoft.com/office/drawing/2010/main" w="9525">
+                  <a14:hiddenLine xmlns:a14="http://schemas.microsoft.com/office/drawing/2010/main" xmlns="" w="9525">
                     <a:solidFill>
                       <a:srgbClr val="000000"/>
                     </a:solidFill>
@@ -12210,7 +12448,7 @@
               </a:ln>
               <a:extLst>
                 <a:ext uri="{91240B29-F687-4f45-9708-019B960494DF}">
-                  <a14:hiddenLine xmlns="" xmlns:a14="http://schemas.microsoft.com/office/drawing/2010/main" w="9525">
+                  <a14:hiddenLine xmlns:a14="http://schemas.microsoft.com/office/drawing/2010/main" xmlns="" w="9525">
                     <a:solidFill>
                       <a:srgbClr val="000000"/>
                     </a:solidFill>
@@ -12300,7 +12538,7 @@
               </a:ln>
               <a:extLst>
                 <a:ext uri="{91240B29-F687-4f45-9708-019B960494DF}">
-                  <a14:hiddenLine xmlns="" xmlns:a14="http://schemas.microsoft.com/office/drawing/2010/main" w="9525">
+                  <a14:hiddenLine xmlns:a14="http://schemas.microsoft.com/office/drawing/2010/main" xmlns="" w="9525">
                     <a:solidFill>
                       <a:srgbClr val="000000"/>
                     </a:solidFill>
@@ -12362,7 +12600,7 @@
               </a:ln>
               <a:extLst>
                 <a:ext uri="{91240B29-F687-4f45-9708-019B960494DF}">
-                  <a14:hiddenLine xmlns="" xmlns:a14="http://schemas.microsoft.com/office/drawing/2010/main" w="9525">
+                  <a14:hiddenLine xmlns:a14="http://schemas.microsoft.com/office/drawing/2010/main" xmlns="" w="9525">
                     <a:solidFill>
                       <a:srgbClr val="000000"/>
                     </a:solidFill>
@@ -12452,7 +12690,7 @@
               </a:ln>
               <a:extLst>
                 <a:ext uri="{91240B29-F687-4f45-9708-019B960494DF}">
-                  <a14:hiddenLine xmlns="" xmlns:a14="http://schemas.microsoft.com/office/drawing/2010/main" w="9525">
+                  <a14:hiddenLine xmlns:a14="http://schemas.microsoft.com/office/drawing/2010/main" xmlns="" w="9525">
                     <a:solidFill>
                       <a:srgbClr val="000000"/>
                     </a:solidFill>
@@ -12517,7 +12755,7 @@
               </a:ln>
               <a:extLst>
                 <a:ext uri="{91240B29-F687-4f45-9708-019B960494DF}">
-                  <a14:hiddenLine xmlns="" xmlns:a14="http://schemas.microsoft.com/office/drawing/2010/main" w="9525">
+                  <a14:hiddenLine xmlns:a14="http://schemas.microsoft.com/office/drawing/2010/main" xmlns="" w="9525">
                     <a:solidFill>
                       <a:srgbClr val="000000"/>
                     </a:solidFill>
@@ -12579,7 +12817,7 @@
               </a:ln>
               <a:extLst>
                 <a:ext uri="{91240B29-F687-4f45-9708-019B960494DF}">
-                  <a14:hiddenLine xmlns="" xmlns:a14="http://schemas.microsoft.com/office/drawing/2010/main" w="9525">
+                  <a14:hiddenLine xmlns:a14="http://schemas.microsoft.com/office/drawing/2010/main" xmlns="" w="9525">
                     <a:solidFill>
                       <a:srgbClr val="000000"/>
                     </a:solidFill>
@@ -12669,7 +12907,7 @@
               </a:ln>
               <a:extLst>
                 <a:ext uri="{91240B29-F687-4f45-9708-019B960494DF}">
-                  <a14:hiddenLine xmlns="" xmlns:a14="http://schemas.microsoft.com/office/drawing/2010/main" w="9525">
+                  <a14:hiddenLine xmlns:a14="http://schemas.microsoft.com/office/drawing/2010/main" xmlns="" w="9525">
                     <a:solidFill>
                       <a:srgbClr val="000000"/>
                     </a:solidFill>
@@ -12759,7 +12997,7 @@
               </a:ln>
               <a:extLst>
                 <a:ext uri="{91240B29-F687-4f45-9708-019B960494DF}">
-                  <a14:hiddenLine xmlns="" xmlns:a14="http://schemas.microsoft.com/office/drawing/2010/main" w="9525">
+                  <a14:hiddenLine xmlns:a14="http://schemas.microsoft.com/office/drawing/2010/main" xmlns="" w="9525">
                     <a:solidFill>
                       <a:srgbClr val="000000"/>
                     </a:solidFill>
@@ -12824,7 +13062,7 @@
               </a:ln>
               <a:extLst>
                 <a:ext uri="{91240B29-F687-4f45-9708-019B960494DF}">
-                  <a14:hiddenLine xmlns="" xmlns:a14="http://schemas.microsoft.com/office/drawing/2010/main" w="9525">
+                  <a14:hiddenLine xmlns:a14="http://schemas.microsoft.com/office/drawing/2010/main" xmlns="" w="9525">
                     <a:solidFill>
                       <a:srgbClr val="000000"/>
                     </a:solidFill>
@@ -12944,7 +13182,7 @@
               </a:ln>
               <a:extLst>
                 <a:ext uri="{91240B29-F687-4f45-9708-019B960494DF}">
-                  <a14:hiddenLine xmlns="" xmlns:a14="http://schemas.microsoft.com/office/drawing/2010/main" w="9525">
+                  <a14:hiddenLine xmlns:a14="http://schemas.microsoft.com/office/drawing/2010/main" xmlns="" w="9525">
                     <a:solidFill>
                       <a:srgbClr val="000000"/>
                     </a:solidFill>
@@ -13042,7 +13280,7 @@
               </a:ln>
               <a:extLst>
                 <a:ext uri="{91240B29-F687-4f45-9708-019B960494DF}">
-                  <a14:hiddenLine xmlns="" xmlns:a14="http://schemas.microsoft.com/office/drawing/2010/main" w="9525">
+                  <a14:hiddenLine xmlns:a14="http://schemas.microsoft.com/office/drawing/2010/main" xmlns="" w="9525">
                     <a:solidFill>
                       <a:srgbClr val="000000"/>
                     </a:solidFill>
@@ -13157,7 +13395,7 @@
               </a:ln>
               <a:extLst>
                 <a:ext uri="{91240B29-F687-4f45-9708-019B960494DF}">
-                  <a14:hiddenLine xmlns="" xmlns:a14="http://schemas.microsoft.com/office/drawing/2010/main" w="9525">
+                  <a14:hiddenLine xmlns:a14="http://schemas.microsoft.com/office/drawing/2010/main" xmlns="" w="9525">
                     <a:solidFill>
                       <a:srgbClr val="000000"/>
                     </a:solidFill>
@@ -13247,7 +13485,7 @@
               </a:ln>
               <a:extLst>
                 <a:ext uri="{91240B29-F687-4f45-9708-019B960494DF}">
-                  <a14:hiddenLine xmlns="" xmlns:a14="http://schemas.microsoft.com/office/drawing/2010/main" w="9525">
+                  <a14:hiddenLine xmlns:a14="http://schemas.microsoft.com/office/drawing/2010/main" xmlns="" w="9525">
                     <a:solidFill>
                       <a:srgbClr val="000000"/>
                     </a:solidFill>
@@ -13312,7 +13550,7 @@
               </a:ln>
               <a:extLst>
                 <a:ext uri="{91240B29-F687-4f45-9708-019B960494DF}">
-                  <a14:hiddenLine xmlns="" xmlns:a14="http://schemas.microsoft.com/office/drawing/2010/main" w="9525">
+                  <a14:hiddenLine xmlns:a14="http://schemas.microsoft.com/office/drawing/2010/main" xmlns="" w="9525">
                     <a:solidFill>
                       <a:srgbClr val="000000"/>
                     </a:solidFill>
@@ -13402,7 +13640,7 @@
               </a:ln>
               <a:extLst>
                 <a:ext uri="{91240B29-F687-4f45-9708-019B960494DF}">
-                  <a14:hiddenLine xmlns="" xmlns:a14="http://schemas.microsoft.com/office/drawing/2010/main" w="9525">
+                  <a14:hiddenLine xmlns:a14="http://schemas.microsoft.com/office/drawing/2010/main" xmlns="" w="9525">
                     <a:solidFill>
                       <a:srgbClr val="000000"/>
                     </a:solidFill>
@@ -13470,7 +13708,7 @@
               </a:ln>
               <a:extLst>
                 <a:ext uri="{91240B29-F687-4f45-9708-019B960494DF}">
-                  <a14:hiddenLine xmlns="" xmlns:a14="http://schemas.microsoft.com/office/drawing/2010/main" w="9525">
+                  <a14:hiddenLine xmlns:a14="http://schemas.microsoft.com/office/drawing/2010/main" xmlns="" w="9525">
                     <a:solidFill>
                       <a:srgbClr val="000000"/>
                     </a:solidFill>
@@ -13560,7 +13798,7 @@
               </a:ln>
               <a:extLst>
                 <a:ext uri="{91240B29-F687-4f45-9708-019B960494DF}">
-                  <a14:hiddenLine xmlns="" xmlns:a14="http://schemas.microsoft.com/office/drawing/2010/main" w="9525">
+                  <a14:hiddenLine xmlns:a14="http://schemas.microsoft.com/office/drawing/2010/main" xmlns="" w="9525">
                     <a:solidFill>
                       <a:srgbClr val="000000"/>
                     </a:solidFill>
@@ -13628,7 +13866,7 @@
               </a:ln>
               <a:extLst>
                 <a:ext uri="{91240B29-F687-4f45-9708-019B960494DF}">
-                  <a14:hiddenLine xmlns="" xmlns:a14="http://schemas.microsoft.com/office/drawing/2010/main" w="9525">
+                  <a14:hiddenLine xmlns:a14="http://schemas.microsoft.com/office/drawing/2010/main" xmlns="" w="9525">
                     <a:solidFill>
                       <a:srgbClr val="000000"/>
                     </a:solidFill>
@@ -13718,7 +13956,7 @@
               </a:ln>
               <a:extLst>
                 <a:ext uri="{91240B29-F687-4f45-9708-019B960494DF}">
-                  <a14:hiddenLine xmlns="" xmlns:a14="http://schemas.microsoft.com/office/drawing/2010/main" w="9525">
+                  <a14:hiddenLine xmlns:a14="http://schemas.microsoft.com/office/drawing/2010/main" xmlns="" w="9525">
                     <a:solidFill>
                       <a:srgbClr val="000000"/>
                     </a:solidFill>
@@ -13752,7 +13990,7 @@
               </a:ln>
               <a:extLst>
                 <a:ext uri="{91240B29-F687-4f45-9708-019B960494DF}">
-                  <a14:hiddenLine xmlns="" xmlns:a14="http://schemas.microsoft.com/office/drawing/2010/main" w="9525">
+                  <a14:hiddenLine xmlns:a14="http://schemas.microsoft.com/office/drawing/2010/main" xmlns="" w="9525">
                     <a:solidFill>
                       <a:srgbClr val="000000"/>
                     </a:solidFill>
@@ -13893,7 +14131,7 @@
             <a:fld id="{48A87A34-81AB-432B-8DAE-1953F412C126}" type="datetimeFigureOut">
               <a:rPr lang="en-US" dirty="0"/>
               <a:pPr/>
-              <a:t>3/30/2021</a:t>
+              <a:t>3/31/2021</a:t>
             </a:fld>
             <a:endParaRPr lang="en-US" dirty="0"/>
           </a:p>

</xml_diff>